<commit_message>
Added selection circles and class icons.
</commit_message>
<xml_diff>
--- a/Documents/Bel Nix Wireframes.pptx
+++ b/Documents/Bel Nix Wireframes.pptx
@@ -13,7 +13,7 @@
     <p:sldId id="265" r:id="rId7"/>
     <p:sldId id="266" r:id="rId8"/>
     <p:sldId id="268" r:id="rId9"/>
-    <p:sldId id="269" r:id="rId10"/>
+    <p:sldId id="283" r:id="rId10"/>
     <p:sldId id="270" r:id="rId11"/>
     <p:sldId id="260" r:id="rId12"/>
     <p:sldId id="261" r:id="rId13"/>
@@ -25,11 +25,9 @@
     <p:sldId id="272" r:id="rId19"/>
     <p:sldId id="271" r:id="rId20"/>
     <p:sldId id="275" r:id="rId21"/>
-    <p:sldId id="276" r:id="rId22"/>
+    <p:sldId id="284" r:id="rId22"/>
     <p:sldId id="277" r:id="rId23"/>
-    <p:sldId id="279" r:id="rId24"/>
-    <p:sldId id="278" r:id="rId25"/>
-    <p:sldId id="280" r:id="rId26"/>
+    <p:sldId id="285" r:id="rId24"/>
   </p:sldIdLst>
   <p:sldSz cx="9144000" cy="6858000" type="screen4x3"/>
   <p:notesSz cx="6858000" cy="9144000"/>
@@ -313,7 +311,7 @@
             <a:fld id="{DFEB74F4-18E0-45A9-BC28-087929DA7966}" type="datetimeFigureOut">
               <a:rPr lang="en-US" smtClean="0"/>
               <a:pPr/>
-              <a:t>10/23/2014</a:t>
+              <a:t>11/8/2014</a:t>
             </a:fld>
             <a:endParaRPr lang="en-US"/>
           </a:p>
@@ -480,7 +478,7 @@
             <a:fld id="{DFEB74F4-18E0-45A9-BC28-087929DA7966}" type="datetimeFigureOut">
               <a:rPr lang="en-US" smtClean="0"/>
               <a:pPr/>
-              <a:t>10/23/2014</a:t>
+              <a:t>11/8/2014</a:t>
             </a:fld>
             <a:endParaRPr lang="en-US"/>
           </a:p>
@@ -657,7 +655,7 @@
             <a:fld id="{DFEB74F4-18E0-45A9-BC28-087929DA7966}" type="datetimeFigureOut">
               <a:rPr lang="en-US" smtClean="0"/>
               <a:pPr/>
-              <a:t>10/23/2014</a:t>
+              <a:t>11/8/2014</a:t>
             </a:fld>
             <a:endParaRPr lang="en-US"/>
           </a:p>
@@ -824,7 +822,7 @@
             <a:fld id="{DFEB74F4-18E0-45A9-BC28-087929DA7966}" type="datetimeFigureOut">
               <a:rPr lang="en-US" smtClean="0"/>
               <a:pPr/>
-              <a:t>10/23/2014</a:t>
+              <a:t>11/8/2014</a:t>
             </a:fld>
             <a:endParaRPr lang="en-US"/>
           </a:p>
@@ -1067,7 +1065,7 @@
             <a:fld id="{DFEB74F4-18E0-45A9-BC28-087929DA7966}" type="datetimeFigureOut">
               <a:rPr lang="en-US" smtClean="0"/>
               <a:pPr/>
-              <a:t>10/23/2014</a:t>
+              <a:t>11/8/2014</a:t>
             </a:fld>
             <a:endParaRPr lang="en-US"/>
           </a:p>
@@ -1352,7 +1350,7 @@
             <a:fld id="{DFEB74F4-18E0-45A9-BC28-087929DA7966}" type="datetimeFigureOut">
               <a:rPr lang="en-US" smtClean="0"/>
               <a:pPr/>
-              <a:t>10/23/2014</a:t>
+              <a:t>11/8/2014</a:t>
             </a:fld>
             <a:endParaRPr lang="en-US"/>
           </a:p>
@@ -1771,7 +1769,7 @@
             <a:fld id="{DFEB74F4-18E0-45A9-BC28-087929DA7966}" type="datetimeFigureOut">
               <a:rPr lang="en-US" smtClean="0"/>
               <a:pPr/>
-              <a:t>10/23/2014</a:t>
+              <a:t>11/8/2014</a:t>
             </a:fld>
             <a:endParaRPr lang="en-US"/>
           </a:p>
@@ -1886,7 +1884,7 @@
             <a:fld id="{DFEB74F4-18E0-45A9-BC28-087929DA7966}" type="datetimeFigureOut">
               <a:rPr lang="en-US" smtClean="0"/>
               <a:pPr/>
-              <a:t>10/23/2014</a:t>
+              <a:t>11/8/2014</a:t>
             </a:fld>
             <a:endParaRPr lang="en-US"/>
           </a:p>
@@ -1978,7 +1976,7 @@
             <a:fld id="{DFEB74F4-18E0-45A9-BC28-087929DA7966}" type="datetimeFigureOut">
               <a:rPr lang="en-US" smtClean="0"/>
               <a:pPr/>
-              <a:t>10/23/2014</a:t>
+              <a:t>11/8/2014</a:t>
             </a:fld>
             <a:endParaRPr lang="en-US"/>
           </a:p>
@@ -2252,7 +2250,7 @@
             <a:fld id="{DFEB74F4-18E0-45A9-BC28-087929DA7966}" type="datetimeFigureOut">
               <a:rPr lang="en-US" smtClean="0"/>
               <a:pPr/>
-              <a:t>10/23/2014</a:t>
+              <a:t>11/8/2014</a:t>
             </a:fld>
             <a:endParaRPr lang="en-US"/>
           </a:p>
@@ -2502,7 +2500,7 @@
             <a:fld id="{DFEB74F4-18E0-45A9-BC28-087929DA7966}" type="datetimeFigureOut">
               <a:rPr lang="en-US" smtClean="0"/>
               <a:pPr/>
-              <a:t>10/23/2014</a:t>
+              <a:t>11/8/2014</a:t>
             </a:fld>
             <a:endParaRPr lang="en-US"/>
           </a:p>
@@ -2712,7 +2710,7 @@
             <a:fld id="{DFEB74F4-18E0-45A9-BC28-087929DA7966}" type="datetimeFigureOut">
               <a:rPr lang="en-US" smtClean="0"/>
               <a:pPr/>
-              <a:t>10/23/2014</a:t>
+              <a:t>11/8/2014</a:t>
             </a:fld>
             <a:endParaRPr lang="en-US"/>
           </a:p>
@@ -3671,7 +3669,7 @@
           <a:blip r:embed="rId2" cstate="print">
             <a:extLst>
               <a:ext uri="{28A0092B-C50C-407E-A947-70E740481C1C}">
-                <a14:useLocalDpi xmlns:a14="http://schemas.microsoft.com/office/drawing/2010/main" val="0"/>
+                <a14:useLocalDpi xmlns:a14="http://schemas.microsoft.com/office/drawing/2010/main" xmlns="" val="0"/>
               </a:ext>
             </a:extLst>
           </a:blip>
@@ -3691,7 +3689,7 @@
           <a:noFill/>
           <a:extLst>
             <a:ext uri="{909E8E84-426E-40DD-AFC4-6F175D3DCCD1}">
-              <a14:hiddenFill xmlns:a14="http://schemas.microsoft.com/office/drawing/2010/main">
+              <a14:hiddenFill xmlns:a14="http://schemas.microsoft.com/office/drawing/2010/main" xmlns="">
                 <a:solidFill>
                   <a:srgbClr val="FFFFFF"/>
                 </a:solidFill>
@@ -4013,7 +4011,7 @@
     </p:spTree>
     <p:extLst>
       <p:ext uri="{BB962C8B-B14F-4D97-AF65-F5344CB8AC3E}">
-        <p14:creationId xmlns:p14="http://schemas.microsoft.com/office/powerpoint/2010/main" val="230200905"/>
+        <p14:creationId xmlns:p14="http://schemas.microsoft.com/office/powerpoint/2010/main" xmlns="" val="230200905"/>
       </p:ext>
     </p:extLst>
   </p:cSld>
@@ -4155,7 +4153,6 @@
               <a:rPr lang="en-US" dirty="0" smtClean="0"/>
               <a:t>Level</a:t>
             </a:r>
-            <a:endParaRPr lang="en-US" dirty="0" smtClean="0"/>
           </a:p>
         </p:txBody>
       </p:sp>
@@ -4211,7 +4208,7 @@
           <a:blip r:embed="rId2" cstate="print">
             <a:extLst>
               <a:ext uri="{28A0092B-C50C-407E-A947-70E740481C1C}">
-                <a14:useLocalDpi xmlns:a14="http://schemas.microsoft.com/office/drawing/2010/main" val="0"/>
+                <a14:useLocalDpi xmlns:a14="http://schemas.microsoft.com/office/drawing/2010/main" xmlns="" val="0"/>
               </a:ext>
             </a:extLst>
           </a:blip>
@@ -4231,7 +4228,7 @@
           <a:noFill/>
           <a:extLst>
             <a:ext uri="{909E8E84-426E-40DD-AFC4-6F175D3DCCD1}">
-              <a14:hiddenFill xmlns:a14="http://schemas.microsoft.com/office/drawing/2010/main">
+              <a14:hiddenFill xmlns:a14="http://schemas.microsoft.com/office/drawing/2010/main" xmlns="">
                 <a:solidFill>
                   <a:srgbClr val="FFFFFF"/>
                 </a:solidFill>
@@ -4979,7 +4976,7 @@
     </p:spTree>
     <p:extLst>
       <p:ext uri="{BB962C8B-B14F-4D97-AF65-F5344CB8AC3E}">
-        <p14:creationId xmlns:p14="http://schemas.microsoft.com/office/powerpoint/2010/main" val="1916122945"/>
+        <p14:creationId xmlns:p14="http://schemas.microsoft.com/office/powerpoint/2010/main" xmlns="" val="1916122945"/>
       </p:ext>
     </p:extLst>
   </p:cSld>
@@ -5210,7 +5207,7 @@
           <a:blip r:embed="rId2" cstate="print">
             <a:extLst>
               <a:ext uri="{28A0092B-C50C-407E-A947-70E740481C1C}">
-                <a14:useLocalDpi xmlns:a14="http://schemas.microsoft.com/office/drawing/2010/main" val="0"/>
+                <a14:useLocalDpi xmlns:a14="http://schemas.microsoft.com/office/drawing/2010/main" xmlns="" val="0"/>
               </a:ext>
             </a:extLst>
           </a:blip>
@@ -5230,7 +5227,7 @@
           <a:noFill/>
           <a:extLst>
             <a:ext uri="{909E8E84-426E-40DD-AFC4-6F175D3DCCD1}">
-              <a14:hiddenFill xmlns:a14="http://schemas.microsoft.com/office/drawing/2010/main">
+              <a14:hiddenFill xmlns:a14="http://schemas.microsoft.com/office/drawing/2010/main" xmlns="">
                 <a:solidFill>
                   <a:srgbClr val="FFFFFF"/>
                 </a:solidFill>
@@ -6377,7 +6374,7 @@
           <a:blip r:embed="rId3" cstate="print">
             <a:extLst>
               <a:ext uri="{28A0092B-C50C-407E-A947-70E740481C1C}">
-                <a14:useLocalDpi xmlns:a14="http://schemas.microsoft.com/office/drawing/2010/main" val="0"/>
+                <a14:useLocalDpi xmlns:a14="http://schemas.microsoft.com/office/drawing/2010/main" xmlns="" val="0"/>
               </a:ext>
             </a:extLst>
           </a:blip>
@@ -6397,7 +6394,7 @@
           <a:noFill/>
           <a:extLst>
             <a:ext uri="{909E8E84-426E-40DD-AFC4-6F175D3DCCD1}">
-              <a14:hiddenFill xmlns:a14="http://schemas.microsoft.com/office/drawing/2010/main">
+              <a14:hiddenFill xmlns:a14="http://schemas.microsoft.com/office/drawing/2010/main" xmlns="">
                 <a:solidFill>
                   <a:srgbClr val="FFFFFF"/>
                 </a:solidFill>
@@ -6418,7 +6415,7 @@
           <a:blip r:embed="rId3" cstate="print">
             <a:extLst>
               <a:ext uri="{28A0092B-C50C-407E-A947-70E740481C1C}">
-                <a14:useLocalDpi xmlns:a14="http://schemas.microsoft.com/office/drawing/2010/main" val="0"/>
+                <a14:useLocalDpi xmlns:a14="http://schemas.microsoft.com/office/drawing/2010/main" xmlns="" val="0"/>
               </a:ext>
             </a:extLst>
           </a:blip>
@@ -6438,7 +6435,7 @@
           <a:noFill/>
           <a:extLst>
             <a:ext uri="{909E8E84-426E-40DD-AFC4-6F175D3DCCD1}">
-              <a14:hiddenFill xmlns:a14="http://schemas.microsoft.com/office/drawing/2010/main">
+              <a14:hiddenFill xmlns:a14="http://schemas.microsoft.com/office/drawing/2010/main" xmlns="">
                 <a:solidFill>
                   <a:srgbClr val="FFFFFF"/>
                 </a:solidFill>
@@ -6562,7 +6559,6 @@
               <a:rPr lang="en-US" dirty="0" smtClean="0"/>
               <a:t>Level</a:t>
             </a:r>
-            <a:endParaRPr lang="en-US" dirty="0" smtClean="0"/>
           </a:p>
         </p:txBody>
       </p:sp>
@@ -6742,7 +6738,7 @@
     </p:spTree>
     <p:extLst>
       <p:ext uri="{BB962C8B-B14F-4D97-AF65-F5344CB8AC3E}">
-        <p14:creationId xmlns:p14="http://schemas.microsoft.com/office/powerpoint/2010/main" val="2703675010"/>
+        <p14:creationId xmlns:p14="http://schemas.microsoft.com/office/powerpoint/2010/main" xmlns="" val="2703675010"/>
       </p:ext>
     </p:extLst>
   </p:cSld>
@@ -7181,7 +7177,7 @@
           <a:blip r:embed="rId2" cstate="print">
             <a:extLst>
               <a:ext uri="{28A0092B-C50C-407E-A947-70E740481C1C}">
-                <a14:useLocalDpi xmlns:a14="http://schemas.microsoft.com/office/drawing/2010/main" val="0"/>
+                <a14:useLocalDpi xmlns:a14="http://schemas.microsoft.com/office/drawing/2010/main" xmlns="" val="0"/>
               </a:ext>
             </a:extLst>
           </a:blip>
@@ -7201,7 +7197,7 @@
           <a:noFill/>
           <a:extLst>
             <a:ext uri="{909E8E84-426E-40DD-AFC4-6F175D3DCCD1}">
-              <a14:hiddenFill xmlns:a14="http://schemas.microsoft.com/office/drawing/2010/main">
+              <a14:hiddenFill xmlns:a14="http://schemas.microsoft.com/office/drawing/2010/main" xmlns="">
                 <a:solidFill>
                   <a:srgbClr val="FFFFFF"/>
                 </a:solidFill>
@@ -9027,7 +9023,6 @@
               <a:rPr lang="en-US" dirty="0" smtClean="0"/>
               <a:t>Level</a:t>
             </a:r>
-            <a:endParaRPr lang="en-US" dirty="0" smtClean="0"/>
           </a:p>
         </p:txBody>
       </p:sp>
@@ -9207,7 +9202,7 @@
     </p:spTree>
     <p:extLst>
       <p:ext uri="{BB962C8B-B14F-4D97-AF65-F5344CB8AC3E}">
-        <p14:creationId xmlns:p14="http://schemas.microsoft.com/office/powerpoint/2010/main" val="3222865792"/>
+        <p14:creationId xmlns:p14="http://schemas.microsoft.com/office/powerpoint/2010/main" xmlns="" val="3222865792"/>
       </p:ext>
     </p:extLst>
   </p:cSld>
@@ -9641,7 +9636,7 @@
           <a:blip r:embed="rId2" cstate="print">
             <a:extLst>
               <a:ext uri="{28A0092B-C50C-407E-A947-70E740481C1C}">
-                <a14:useLocalDpi xmlns:a14="http://schemas.microsoft.com/office/drawing/2010/main" val="0"/>
+                <a14:useLocalDpi xmlns:a14="http://schemas.microsoft.com/office/drawing/2010/main" xmlns="" val="0"/>
               </a:ext>
             </a:extLst>
           </a:blip>
@@ -9661,7 +9656,7 @@
           <a:noFill/>
           <a:extLst>
             <a:ext uri="{909E8E84-426E-40DD-AFC4-6F175D3DCCD1}">
-              <a14:hiddenFill xmlns:a14="http://schemas.microsoft.com/office/drawing/2010/main">
+              <a14:hiddenFill xmlns:a14="http://schemas.microsoft.com/office/drawing/2010/main" xmlns="">
                 <a:solidFill>
                   <a:srgbClr val="FFFFFF"/>
                 </a:solidFill>
@@ -10648,11 +10643,6 @@
               </a:rPr>
               <a:t>Athletics</a:t>
             </a:r>
-            <a:endParaRPr lang="en-US" sz="1200" b="1" dirty="0" smtClean="0">
-              <a:solidFill>
-                <a:schemeClr val="bg1"/>
-              </a:solidFill>
-            </a:endParaRPr>
           </a:p>
         </p:txBody>
       </p:sp>
@@ -10706,11 +10696,6 @@
               </a:rPr>
               <a:t>Ranged</a:t>
             </a:r>
-            <a:endParaRPr lang="en-US" sz="1200" b="1" dirty="0" smtClean="0">
-              <a:solidFill>
-                <a:schemeClr val="bg1"/>
-              </a:solidFill>
-            </a:endParaRPr>
           </a:p>
         </p:txBody>
       </p:sp>
@@ -10764,11 +10749,6 @@
               </a:rPr>
               <a:t>Mechanical</a:t>
             </a:r>
-            <a:endParaRPr lang="en-US" sz="1200" b="1" dirty="0" smtClean="0">
-              <a:solidFill>
-                <a:schemeClr val="bg1"/>
-              </a:solidFill>
-            </a:endParaRPr>
           </a:p>
         </p:txBody>
       </p:sp>
@@ -10822,11 +10802,6 @@
               </a:rPr>
               <a:t>Historical</a:t>
             </a:r>
-            <a:endParaRPr lang="en-US" sz="1200" b="1" dirty="0" smtClean="0">
-              <a:solidFill>
-                <a:schemeClr val="bg1"/>
-              </a:solidFill>
-            </a:endParaRPr>
           </a:p>
         </p:txBody>
       </p:sp>
@@ -10876,11 +10851,6 @@
               </a:rPr>
               <a:t>Melee</a:t>
             </a:r>
-            <a:endParaRPr lang="en-US" sz="1200" b="1" dirty="0" smtClean="0">
-              <a:solidFill>
-                <a:schemeClr val="bg1"/>
-              </a:solidFill>
-            </a:endParaRPr>
           </a:p>
         </p:txBody>
       </p:sp>
@@ -10934,11 +10904,6 @@
               </a:rPr>
               <a:t>Stealth</a:t>
             </a:r>
-            <a:endParaRPr lang="en-US" sz="1200" b="1" dirty="0" smtClean="0">
-              <a:solidFill>
-                <a:schemeClr val="bg1"/>
-              </a:solidFill>
-            </a:endParaRPr>
           </a:p>
         </p:txBody>
       </p:sp>
@@ -10992,11 +10957,6 @@
               </a:rPr>
               <a:t>Medicinal</a:t>
             </a:r>
-            <a:endParaRPr lang="en-US" sz="1200" b="1" dirty="0" smtClean="0">
-              <a:solidFill>
-                <a:schemeClr val="bg1"/>
-              </a:solidFill>
-            </a:endParaRPr>
           </a:p>
         </p:txBody>
       </p:sp>
@@ -11050,11 +11010,6 @@
               </a:rPr>
               <a:t>Political</a:t>
             </a:r>
-            <a:endParaRPr lang="en-US" sz="1200" b="1" dirty="0" smtClean="0">
-              <a:solidFill>
-                <a:schemeClr val="bg1"/>
-              </a:solidFill>
-            </a:endParaRPr>
           </a:p>
         </p:txBody>
       </p:sp>
@@ -11648,7 +11603,6 @@
               <a:rPr lang="en-US" dirty="0" smtClean="0"/>
               <a:t>Level</a:t>
             </a:r>
-            <a:endParaRPr lang="en-US" dirty="0" smtClean="0"/>
           </a:p>
         </p:txBody>
       </p:sp>
@@ -12034,7 +11988,7 @@
     </p:spTree>
     <p:extLst>
       <p:ext uri="{BB962C8B-B14F-4D97-AF65-F5344CB8AC3E}">
-        <p14:creationId xmlns:p14="http://schemas.microsoft.com/office/powerpoint/2010/main" val="2988061221"/>
+        <p14:creationId xmlns:p14="http://schemas.microsoft.com/office/powerpoint/2010/main" xmlns="" val="2988061221"/>
       </p:ext>
     </p:extLst>
   </p:cSld>
@@ -12272,7 +12226,7 @@
           <a:blip r:embed="rId2" cstate="print">
             <a:extLst>
               <a:ext uri="{28A0092B-C50C-407E-A947-70E740481C1C}">
-                <a14:useLocalDpi xmlns:a14="http://schemas.microsoft.com/office/drawing/2010/main" val="0"/>
+                <a14:useLocalDpi xmlns:a14="http://schemas.microsoft.com/office/drawing/2010/main" xmlns="" val="0"/>
               </a:ext>
             </a:extLst>
           </a:blip>
@@ -12292,7 +12246,7 @@
           <a:noFill/>
           <a:extLst>
             <a:ext uri="{909E8E84-426E-40DD-AFC4-6F175D3DCCD1}">
-              <a14:hiddenFill xmlns:a14="http://schemas.microsoft.com/office/drawing/2010/main">
+              <a14:hiddenFill xmlns:a14="http://schemas.microsoft.com/office/drawing/2010/main" xmlns="">
                 <a:solidFill>
                   <a:srgbClr val="FFFFFF"/>
                 </a:solidFill>
@@ -13222,7 +13176,6 @@
               <a:rPr lang="en-US" dirty="0" smtClean="0"/>
               <a:t>Level</a:t>
             </a:r>
-            <a:endParaRPr lang="en-US" dirty="0" smtClean="0"/>
           </a:p>
         </p:txBody>
       </p:sp>
@@ -14738,7 +14691,7 @@
     </p:spTree>
     <p:extLst>
       <p:ext uri="{BB962C8B-B14F-4D97-AF65-F5344CB8AC3E}">
-        <p14:creationId xmlns:p14="http://schemas.microsoft.com/office/powerpoint/2010/main" val="1218614478"/>
+        <p14:creationId xmlns:p14="http://schemas.microsoft.com/office/powerpoint/2010/main" xmlns="" val="1218614478"/>
       </p:ext>
     </p:extLst>
   </p:cSld>
@@ -14976,7 +14929,7 @@
           <a:blip r:embed="rId2" cstate="print">
             <a:extLst>
               <a:ext uri="{28A0092B-C50C-407E-A947-70E740481C1C}">
-                <a14:useLocalDpi xmlns:a14="http://schemas.microsoft.com/office/drawing/2010/main" val="0"/>
+                <a14:useLocalDpi xmlns:a14="http://schemas.microsoft.com/office/drawing/2010/main" xmlns="" val="0"/>
               </a:ext>
             </a:extLst>
           </a:blip>
@@ -14996,7 +14949,7 @@
           <a:noFill/>
           <a:extLst>
             <a:ext uri="{909E8E84-426E-40DD-AFC4-6F175D3DCCD1}">
-              <a14:hiddenFill xmlns:a14="http://schemas.microsoft.com/office/drawing/2010/main">
+              <a14:hiddenFill xmlns:a14="http://schemas.microsoft.com/office/drawing/2010/main" xmlns="">
                 <a:solidFill>
                   <a:srgbClr val="FFFFFF"/>
                 </a:solidFill>
@@ -15903,7 +15856,6 @@
               <a:rPr lang="en-US" dirty="0" smtClean="0"/>
               <a:t>Level</a:t>
             </a:r>
-            <a:endParaRPr lang="en-US" dirty="0" smtClean="0"/>
           </a:p>
         </p:txBody>
       </p:sp>
@@ -17131,7 +17083,7 @@
     </p:spTree>
     <p:extLst>
       <p:ext uri="{BB962C8B-B14F-4D97-AF65-F5344CB8AC3E}">
-        <p14:creationId xmlns:p14="http://schemas.microsoft.com/office/powerpoint/2010/main" val="276805881"/>
+        <p14:creationId xmlns:p14="http://schemas.microsoft.com/office/powerpoint/2010/main" xmlns="" val="276805881"/>
       </p:ext>
     </p:extLst>
   </p:cSld>
@@ -17621,11 +17573,13 @@
         </p:nvSpPr>
         <p:spPr>
           <a:xfrm>
-            <a:off x="1143000" y="838200"/>
-            <a:ext cx="7086600" cy="5029200"/>
+            <a:off x="1066800" y="838200"/>
+            <a:ext cx="7162800" cy="5029200"/>
           </a:xfrm>
           <a:prstGeom prst="roundRect">
-            <a:avLst/>
+            <a:avLst>
+              <a:gd name="adj" fmla="val 11912"/>
+            </a:avLst>
           </a:prstGeom>
         </p:spPr>
         <p:style>
@@ -17655,14 +17609,322 @@
       </p:sp>
       <p:sp>
         <p:nvSpPr>
-          <p:cNvPr id="5" name="Round Same Side Corner Rectangle 4"/>
-          <p:cNvSpPr/>
-          <p:nvPr/>
-        </p:nvSpPr>
-        <p:spPr>
-          <a:xfrm rot="16200000">
-            <a:off x="-533400" y="2514600"/>
-            <a:ext cx="5029200" cy="1676400"/>
+          <p:cNvPr id="6" name="Rectangle 5"/>
+          <p:cNvSpPr/>
+          <p:nvPr/>
+        </p:nvSpPr>
+        <p:spPr>
+          <a:xfrm>
+            <a:off x="2971800" y="3429000"/>
+            <a:ext cx="1447800" cy="304800"/>
+          </a:xfrm>
+          <a:prstGeom prst="rect">
+            <a:avLst/>
+          </a:prstGeom>
+        </p:spPr>
+        <p:style>
+          <a:lnRef idx="2">
+            <a:schemeClr val="accent1">
+              <a:shade val="50000"/>
+            </a:schemeClr>
+          </a:lnRef>
+          <a:fillRef idx="1">
+            <a:schemeClr val="accent1"/>
+          </a:fillRef>
+          <a:effectRef idx="0">
+            <a:schemeClr val="accent1"/>
+          </a:effectRef>
+          <a:fontRef idx="minor">
+            <a:schemeClr val="lt1"/>
+          </a:fontRef>
+        </p:style>
+        <p:txBody>
+          <a:bodyPr rtlCol="0" anchor="ctr"/>
+          <a:lstStyle/>
+          <a:p>
+            <a:pPr algn="ctr"/>
+            <a:r>
+              <a:rPr lang="en-US" dirty="0" smtClean="0"/>
+              <a:t>Video</a:t>
+            </a:r>
+            <a:endParaRPr lang="en-US" dirty="0"/>
+          </a:p>
+        </p:txBody>
+      </p:sp>
+      <p:sp>
+        <p:nvSpPr>
+          <p:cNvPr id="7" name="Rectangle 6"/>
+          <p:cNvSpPr/>
+          <p:nvPr/>
+        </p:nvSpPr>
+        <p:spPr>
+          <a:xfrm>
+            <a:off x="2971800" y="4724400"/>
+            <a:ext cx="1447800" cy="304800"/>
+          </a:xfrm>
+          <a:prstGeom prst="rect">
+            <a:avLst/>
+          </a:prstGeom>
+        </p:spPr>
+        <p:style>
+          <a:lnRef idx="2">
+            <a:schemeClr val="accent1">
+              <a:shade val="50000"/>
+            </a:schemeClr>
+          </a:lnRef>
+          <a:fillRef idx="1">
+            <a:schemeClr val="accent1"/>
+          </a:fillRef>
+          <a:effectRef idx="0">
+            <a:schemeClr val="accent1"/>
+          </a:effectRef>
+          <a:fontRef idx="minor">
+            <a:schemeClr val="lt1"/>
+          </a:fontRef>
+        </p:style>
+        <p:txBody>
+          <a:bodyPr rtlCol="0" anchor="ctr"/>
+          <a:lstStyle/>
+          <a:p>
+            <a:pPr algn="ctr"/>
+            <a:r>
+              <a:rPr lang="en-US" dirty="0" smtClean="0"/>
+              <a:t>Audio</a:t>
+            </a:r>
+            <a:endParaRPr lang="en-US" dirty="0"/>
+          </a:p>
+        </p:txBody>
+      </p:sp>
+      <p:sp>
+        <p:nvSpPr>
+          <p:cNvPr id="8" name="Rectangle 7"/>
+          <p:cNvSpPr/>
+          <p:nvPr/>
+        </p:nvSpPr>
+        <p:spPr>
+          <a:xfrm>
+            <a:off x="2971800" y="2057400"/>
+            <a:ext cx="1447800" cy="304800"/>
+          </a:xfrm>
+          <a:prstGeom prst="rect">
+            <a:avLst/>
+          </a:prstGeom>
+        </p:spPr>
+        <p:style>
+          <a:lnRef idx="2">
+            <a:schemeClr val="accent1">
+              <a:shade val="50000"/>
+            </a:schemeClr>
+          </a:lnRef>
+          <a:fillRef idx="1">
+            <a:schemeClr val="accent1"/>
+          </a:fillRef>
+          <a:effectRef idx="0">
+            <a:schemeClr val="accent1"/>
+          </a:effectRef>
+          <a:fontRef idx="minor">
+            <a:schemeClr val="lt1"/>
+          </a:fontRef>
+        </p:style>
+        <p:txBody>
+          <a:bodyPr rtlCol="0" anchor="ctr"/>
+          <a:lstStyle/>
+          <a:p>
+            <a:pPr algn="ctr"/>
+            <a:r>
+              <a:rPr lang="en-US" dirty="0" err="1" smtClean="0"/>
+              <a:t>Gameplay</a:t>
+            </a:r>
+            <a:endParaRPr lang="en-US" dirty="0"/>
+          </a:p>
+        </p:txBody>
+      </p:sp>
+      <p:sp>
+        <p:nvSpPr>
+          <p:cNvPr id="9" name="Rectangle 8"/>
+          <p:cNvSpPr/>
+          <p:nvPr/>
+        </p:nvSpPr>
+        <p:spPr>
+          <a:xfrm>
+            <a:off x="1371600" y="2514600"/>
+            <a:ext cx="1447800" cy="304800"/>
+          </a:xfrm>
+          <a:prstGeom prst="rect">
+            <a:avLst/>
+          </a:prstGeom>
+        </p:spPr>
+        <p:style>
+          <a:lnRef idx="2">
+            <a:schemeClr val="accent1">
+              <a:shade val="50000"/>
+            </a:schemeClr>
+          </a:lnRef>
+          <a:fillRef idx="1">
+            <a:schemeClr val="accent1"/>
+          </a:fillRef>
+          <a:effectRef idx="0">
+            <a:schemeClr val="accent1"/>
+          </a:effectRef>
+          <a:fontRef idx="minor">
+            <a:schemeClr val="lt1"/>
+          </a:fontRef>
+        </p:style>
+        <p:txBody>
+          <a:bodyPr rtlCol="0" anchor="ctr"/>
+          <a:lstStyle/>
+          <a:p>
+            <a:pPr algn="ctr"/>
+            <a:r>
+              <a:rPr lang="en-US" dirty="0" smtClean="0"/>
+              <a:t>Save</a:t>
+            </a:r>
+            <a:endParaRPr lang="en-US" dirty="0"/>
+          </a:p>
+        </p:txBody>
+      </p:sp>
+      <p:sp>
+        <p:nvSpPr>
+          <p:cNvPr id="10" name="Rectangle 9"/>
+          <p:cNvSpPr/>
+          <p:nvPr/>
+        </p:nvSpPr>
+        <p:spPr>
+          <a:xfrm>
+            <a:off x="1371600" y="4724400"/>
+            <a:ext cx="1447800" cy="304800"/>
+          </a:xfrm>
+          <a:prstGeom prst="rect">
+            <a:avLst/>
+          </a:prstGeom>
+        </p:spPr>
+        <p:style>
+          <a:lnRef idx="2">
+            <a:schemeClr val="accent1">
+              <a:shade val="50000"/>
+            </a:schemeClr>
+          </a:lnRef>
+          <a:fillRef idx="1">
+            <a:schemeClr val="accent1"/>
+          </a:fillRef>
+          <a:effectRef idx="0">
+            <a:schemeClr val="accent1"/>
+          </a:effectRef>
+          <a:fontRef idx="minor">
+            <a:schemeClr val="lt1"/>
+          </a:fontRef>
+        </p:style>
+        <p:txBody>
+          <a:bodyPr rtlCol="0" anchor="ctr"/>
+          <a:lstStyle/>
+          <a:p>
+            <a:pPr algn="ctr"/>
+            <a:r>
+              <a:rPr lang="en-US" dirty="0" smtClean="0"/>
+              <a:t>Close</a:t>
+            </a:r>
+            <a:endParaRPr lang="en-US" dirty="0"/>
+          </a:p>
+        </p:txBody>
+      </p:sp>
+      <p:sp>
+        <p:nvSpPr>
+          <p:cNvPr id="11" name="Rectangle 10"/>
+          <p:cNvSpPr/>
+          <p:nvPr/>
+        </p:nvSpPr>
+        <p:spPr>
+          <a:xfrm>
+            <a:off x="1371600" y="3810000"/>
+            <a:ext cx="1447800" cy="304800"/>
+          </a:xfrm>
+          <a:prstGeom prst="rect">
+            <a:avLst/>
+          </a:prstGeom>
+        </p:spPr>
+        <p:style>
+          <a:lnRef idx="2">
+            <a:schemeClr val="accent1">
+              <a:shade val="50000"/>
+            </a:schemeClr>
+          </a:lnRef>
+          <a:fillRef idx="1">
+            <a:schemeClr val="accent1"/>
+          </a:fillRef>
+          <a:effectRef idx="0">
+            <a:schemeClr val="accent1"/>
+          </a:effectRef>
+          <a:fontRef idx="minor">
+            <a:schemeClr val="lt1"/>
+          </a:fontRef>
+        </p:style>
+        <p:txBody>
+          <a:bodyPr rtlCol="0" anchor="ctr"/>
+          <a:lstStyle/>
+          <a:p>
+            <a:pPr algn="ctr"/>
+            <a:r>
+              <a:rPr lang="en-US" sz="1200" dirty="0" smtClean="0"/>
+              <a:t>Quit to Main Menu</a:t>
+            </a:r>
+            <a:endParaRPr lang="en-US" sz="1200" dirty="0"/>
+          </a:p>
+        </p:txBody>
+      </p:sp>
+      <p:sp>
+        <p:nvSpPr>
+          <p:cNvPr id="12" name="Rectangle 11"/>
+          <p:cNvSpPr/>
+          <p:nvPr/>
+        </p:nvSpPr>
+        <p:spPr>
+          <a:xfrm>
+            <a:off x="1371600" y="4267200"/>
+            <a:ext cx="1447800" cy="304800"/>
+          </a:xfrm>
+          <a:prstGeom prst="rect">
+            <a:avLst/>
+          </a:prstGeom>
+        </p:spPr>
+        <p:style>
+          <a:lnRef idx="2">
+            <a:schemeClr val="accent1">
+              <a:shade val="50000"/>
+            </a:schemeClr>
+          </a:lnRef>
+          <a:fillRef idx="1">
+            <a:schemeClr val="accent1"/>
+          </a:fillRef>
+          <a:effectRef idx="0">
+            <a:schemeClr val="accent1"/>
+          </a:effectRef>
+          <a:fontRef idx="minor">
+            <a:schemeClr val="lt1"/>
+          </a:fontRef>
+        </p:style>
+        <p:txBody>
+          <a:bodyPr rtlCol="0" anchor="ctr"/>
+          <a:lstStyle/>
+          <a:p>
+            <a:pPr algn="ctr"/>
+            <a:r>
+              <a:rPr lang="en-US" sz="1200" dirty="0" smtClean="0"/>
+              <a:t>Quit to Desktop</a:t>
+            </a:r>
+            <a:endParaRPr lang="en-US" sz="1200" dirty="0"/>
+          </a:p>
+        </p:txBody>
+      </p:sp>
+      <p:sp>
+        <p:nvSpPr>
+          <p:cNvPr id="13" name="Round Same Side Corner Rectangle 12"/>
+          <p:cNvSpPr/>
+          <p:nvPr/>
+        </p:nvSpPr>
+        <p:spPr>
+          <a:xfrm>
+            <a:off x="1066800" y="838200"/>
+            <a:ext cx="7162800" cy="1219200"/>
           </a:xfrm>
           <a:prstGeom prst="round2SameRect">
             <a:avLst>
@@ -17692,19 +17954,23 @@
           <a:lstStyle/>
           <a:p>
             <a:pPr algn="ctr"/>
-            <a:endParaRPr lang="en-US"/>
-          </a:p>
-        </p:txBody>
-      </p:sp>
-      <p:sp>
-        <p:nvSpPr>
-          <p:cNvPr id="6" name="Rectangle 5"/>
-          <p:cNvSpPr/>
-          <p:nvPr/>
-        </p:nvSpPr>
-        <p:spPr>
-          <a:xfrm>
-            <a:off x="1219200" y="2438400"/>
+            <a:r>
+              <a:rPr lang="en-US" sz="3200" b="1" dirty="0" smtClean="0"/>
+              <a:t>Options</a:t>
+            </a:r>
+            <a:endParaRPr lang="en-US" sz="3200" b="1" dirty="0"/>
+          </a:p>
+        </p:txBody>
+      </p:sp>
+      <p:sp>
+        <p:nvSpPr>
+          <p:cNvPr id="14" name="Rectangle 13"/>
+          <p:cNvSpPr/>
+          <p:nvPr/>
+        </p:nvSpPr>
+        <p:spPr>
+          <a:xfrm>
+            <a:off x="1371600" y="3124200"/>
             <a:ext cx="1447800" cy="304800"/>
           </a:xfrm>
           <a:prstGeom prst="rect">
@@ -17732,167 +17998,11 @@
           <a:lstStyle/>
           <a:p>
             <a:pPr algn="ctr"/>
-            <a:endParaRPr lang="en-US"/>
-          </a:p>
-        </p:txBody>
-      </p:sp>
-      <p:sp>
-        <p:nvSpPr>
-          <p:cNvPr id="7" name="Rectangle 6"/>
-          <p:cNvSpPr/>
-          <p:nvPr/>
-        </p:nvSpPr>
-        <p:spPr>
-          <a:xfrm>
-            <a:off x="1219200" y="3124200"/>
-            <a:ext cx="1447800" cy="304800"/>
-          </a:xfrm>
-          <a:prstGeom prst="rect">
-            <a:avLst/>
-          </a:prstGeom>
-        </p:spPr>
-        <p:style>
-          <a:lnRef idx="2">
-            <a:schemeClr val="accent1">
-              <a:shade val="50000"/>
-            </a:schemeClr>
-          </a:lnRef>
-          <a:fillRef idx="1">
-            <a:schemeClr val="accent1"/>
-          </a:fillRef>
-          <a:effectRef idx="0">
-            <a:schemeClr val="accent1"/>
-          </a:effectRef>
-          <a:fontRef idx="minor">
-            <a:schemeClr val="lt1"/>
-          </a:fontRef>
-        </p:style>
-        <p:txBody>
-          <a:bodyPr rtlCol="0" anchor="ctr"/>
-          <a:lstStyle/>
-          <a:p>
-            <a:pPr algn="ctr"/>
-            <a:endParaRPr lang="en-US"/>
-          </a:p>
-        </p:txBody>
-      </p:sp>
-      <p:sp>
-        <p:nvSpPr>
-          <p:cNvPr id="8" name="Rectangle 7"/>
-          <p:cNvSpPr/>
-          <p:nvPr/>
-        </p:nvSpPr>
-        <p:spPr>
-          <a:xfrm>
-            <a:off x="1219200" y="3810000"/>
-            <a:ext cx="1447800" cy="304800"/>
-          </a:xfrm>
-          <a:prstGeom prst="rect">
-            <a:avLst/>
-          </a:prstGeom>
-        </p:spPr>
-        <p:style>
-          <a:lnRef idx="2">
-            <a:schemeClr val="accent1">
-              <a:shade val="50000"/>
-            </a:schemeClr>
-          </a:lnRef>
-          <a:fillRef idx="1">
-            <a:schemeClr val="accent1"/>
-          </a:fillRef>
-          <a:effectRef idx="0">
-            <a:schemeClr val="accent1"/>
-          </a:effectRef>
-          <a:fontRef idx="minor">
-            <a:schemeClr val="lt1"/>
-          </a:fontRef>
-        </p:style>
-        <p:txBody>
-          <a:bodyPr rtlCol="0" anchor="ctr"/>
-          <a:lstStyle/>
-          <a:p>
-            <a:pPr algn="ctr"/>
-            <a:endParaRPr lang="en-US"/>
-          </a:p>
-        </p:txBody>
-      </p:sp>
-      <p:sp>
-        <p:nvSpPr>
-          <p:cNvPr id="9" name="Rectangle 8"/>
-          <p:cNvSpPr/>
-          <p:nvPr/>
-        </p:nvSpPr>
-        <p:spPr>
-          <a:xfrm>
-            <a:off x="1219200" y="4495800"/>
-            <a:ext cx="1447800" cy="304800"/>
-          </a:xfrm>
-          <a:prstGeom prst="rect">
-            <a:avLst/>
-          </a:prstGeom>
-        </p:spPr>
-        <p:style>
-          <a:lnRef idx="2">
-            <a:schemeClr val="accent1">
-              <a:shade val="50000"/>
-            </a:schemeClr>
-          </a:lnRef>
-          <a:fillRef idx="1">
-            <a:schemeClr val="accent1"/>
-          </a:fillRef>
-          <a:effectRef idx="0">
-            <a:schemeClr val="accent1"/>
-          </a:effectRef>
-          <a:fontRef idx="minor">
-            <a:schemeClr val="lt1"/>
-          </a:fontRef>
-        </p:style>
-        <p:txBody>
-          <a:bodyPr rtlCol="0" anchor="ctr"/>
-          <a:lstStyle/>
-          <a:p>
-            <a:pPr algn="ctr"/>
-            <a:endParaRPr lang="en-US"/>
-          </a:p>
-        </p:txBody>
-      </p:sp>
-      <p:sp>
-        <p:nvSpPr>
-          <p:cNvPr id="10" name="Rectangle 9"/>
-          <p:cNvSpPr/>
-          <p:nvPr/>
-        </p:nvSpPr>
-        <p:spPr>
-          <a:xfrm>
-            <a:off x="1219200" y="1676400"/>
-            <a:ext cx="1447800" cy="304800"/>
-          </a:xfrm>
-          <a:prstGeom prst="rect">
-            <a:avLst/>
-          </a:prstGeom>
-        </p:spPr>
-        <p:style>
-          <a:lnRef idx="2">
-            <a:schemeClr val="accent1">
-              <a:shade val="50000"/>
-            </a:schemeClr>
-          </a:lnRef>
-          <a:fillRef idx="1">
-            <a:schemeClr val="accent1"/>
-          </a:fillRef>
-          <a:effectRef idx="0">
-            <a:schemeClr val="accent1"/>
-          </a:effectRef>
-          <a:fontRef idx="minor">
-            <a:schemeClr val="lt1"/>
-          </a:fontRef>
-        </p:style>
-        <p:txBody>
-          <a:bodyPr rtlCol="0" anchor="ctr"/>
-          <a:lstStyle/>
-          <a:p>
-            <a:pPr algn="ctr"/>
-            <a:endParaRPr lang="en-US"/>
+            <a:r>
+              <a:rPr lang="en-US" dirty="0" smtClean="0"/>
+              <a:t>Load</a:t>
+            </a:r>
+            <a:endParaRPr lang="en-US" dirty="0"/>
           </a:p>
         </p:txBody>
       </p:sp>
@@ -17969,79 +18079,271 @@
           <a:chExt cx="0" cy="0"/>
         </a:xfrm>
       </p:grpSpPr>
-    </p:spTree>
-  </p:cSld>
-  <p:clrMapOvr>
-    <a:masterClrMapping/>
-  </p:clrMapOvr>
-</p:sld>
-</file>
-
-<file path=ppt/slides/slide24.xml><?xml version="1.0" encoding="utf-8"?>
-<p:sld xmlns:a="http://schemas.openxmlformats.org/drawingml/2006/main" xmlns:r="http://schemas.openxmlformats.org/officeDocument/2006/relationships" xmlns:p="http://schemas.openxmlformats.org/presentationml/2006/main">
-  <p:cSld>
-    <p:spTree>
-      <p:nvGrpSpPr>
-        <p:cNvPr id="1" name=""/>
-        <p:cNvGrpSpPr/>
-        <p:nvPr/>
-      </p:nvGrpSpPr>
-      <p:grpSpPr>
-        <a:xfrm>
-          <a:off x="0" y="0"/>
-          <a:ext cx="0" cy="0"/>
-          <a:chOff x="0" y="0"/>
-          <a:chExt cx="0" cy="0"/>
-        </a:xfrm>
-      </p:grpSpPr>
-      <p:sp>
-        <p:nvSpPr>
-          <p:cNvPr id="2" name="Title 1"/>
-          <p:cNvSpPr>
-            <a:spLocks noGrp="1"/>
-          </p:cNvSpPr>
-          <p:nvPr>
-            <p:ph type="ctrTitle"/>
-          </p:nvPr>
-        </p:nvSpPr>
-        <p:spPr/>
-        <p:txBody>
-          <a:bodyPr/>
-          <a:lstStyle/>
-          <a:p>
+      <p:sp>
+        <p:nvSpPr>
+          <p:cNvPr id="2" name="Rounded Rectangle 1"/>
+          <p:cNvSpPr/>
+          <p:nvPr/>
+        </p:nvSpPr>
+        <p:spPr>
+          <a:xfrm>
+            <a:off x="2895600" y="762000"/>
+            <a:ext cx="3505200" cy="4800600"/>
+          </a:xfrm>
+          <a:prstGeom prst="roundRect">
+            <a:avLst>
+              <a:gd name="adj" fmla="val 11912"/>
+            </a:avLst>
+          </a:prstGeom>
+        </p:spPr>
+        <p:style>
+          <a:lnRef idx="2">
+            <a:schemeClr val="accent1">
+              <a:shade val="50000"/>
+            </a:schemeClr>
+          </a:lnRef>
+          <a:fillRef idx="1">
+            <a:schemeClr val="accent1"/>
+          </a:fillRef>
+          <a:effectRef idx="0">
+            <a:schemeClr val="accent1"/>
+          </a:effectRef>
+          <a:fontRef idx="minor">
+            <a:schemeClr val="lt1"/>
+          </a:fontRef>
+        </p:style>
+        <p:txBody>
+          <a:bodyPr rtlCol="0" anchor="ctr"/>
+          <a:lstStyle/>
+          <a:p>
+            <a:pPr algn="ctr"/>
+            <a:endParaRPr lang="en-US" dirty="0"/>
+          </a:p>
+        </p:txBody>
+      </p:sp>
+      <p:sp>
+        <p:nvSpPr>
+          <p:cNvPr id="3" name="Round Same Side Corner Rectangle 2"/>
+          <p:cNvSpPr/>
+          <p:nvPr/>
+        </p:nvSpPr>
+        <p:spPr>
+          <a:xfrm>
+            <a:off x="2895600" y="762000"/>
+            <a:ext cx="3505200" cy="838200"/>
+          </a:xfrm>
+          <a:prstGeom prst="round2SameRect">
+            <a:avLst>
+              <a:gd name="adj1" fmla="val 50000"/>
+              <a:gd name="adj2" fmla="val 0"/>
+            </a:avLst>
+          </a:prstGeom>
+        </p:spPr>
+        <p:style>
+          <a:lnRef idx="2">
+            <a:schemeClr val="accent1">
+              <a:shade val="50000"/>
+            </a:schemeClr>
+          </a:lnRef>
+          <a:fillRef idx="1">
+            <a:schemeClr val="accent1"/>
+          </a:fillRef>
+          <a:effectRef idx="0">
+            <a:schemeClr val="accent1"/>
+          </a:effectRef>
+          <a:fontRef idx="minor">
+            <a:schemeClr val="lt1"/>
+          </a:fontRef>
+        </p:style>
+        <p:txBody>
+          <a:bodyPr rtlCol="0" anchor="ctr"/>
+          <a:lstStyle/>
+          <a:p>
+            <a:pPr algn="ctr"/>
+            <a:r>
+              <a:rPr lang="en-US" sz="3200" b="1" dirty="0" smtClean="0"/>
+              <a:t>Game Over</a:t>
+            </a:r>
+            <a:endParaRPr lang="en-US" sz="3200" b="1" dirty="0"/>
+          </a:p>
+        </p:txBody>
+      </p:sp>
+      <p:sp>
+        <p:nvSpPr>
+          <p:cNvPr id="7" name="Rectangle 6"/>
+          <p:cNvSpPr/>
+          <p:nvPr/>
+        </p:nvSpPr>
+        <p:spPr>
+          <a:xfrm>
+            <a:off x="3657600" y="1981200"/>
+            <a:ext cx="1981200" cy="533400"/>
+          </a:xfrm>
+          <a:prstGeom prst="rect">
+            <a:avLst/>
+          </a:prstGeom>
+        </p:spPr>
+        <p:style>
+          <a:lnRef idx="2">
+            <a:schemeClr val="accent1">
+              <a:shade val="50000"/>
+            </a:schemeClr>
+          </a:lnRef>
+          <a:fillRef idx="1">
+            <a:schemeClr val="accent1"/>
+          </a:fillRef>
+          <a:effectRef idx="0">
+            <a:schemeClr val="accent1"/>
+          </a:effectRef>
+          <a:fontRef idx="minor">
+            <a:schemeClr val="lt1"/>
+          </a:fontRef>
+        </p:style>
+        <p:txBody>
+          <a:bodyPr rtlCol="0" anchor="ctr"/>
+          <a:lstStyle/>
+          <a:p>
+            <a:pPr algn="ctr"/>
             <a:r>
               <a:rPr lang="en-US" dirty="0" smtClean="0"/>
-              <a:t>Save/Load</a:t>
+              <a:t>Load Last Save</a:t>
             </a:r>
             <a:endParaRPr lang="en-US" dirty="0"/>
           </a:p>
         </p:txBody>
       </p:sp>
-    </p:spTree>
-  </p:cSld>
-  <p:clrMapOvr>
-    <a:masterClrMapping/>
-  </p:clrMapOvr>
-</p:sld>
-</file>
-
-<file path=ppt/slides/slide25.xml><?xml version="1.0" encoding="utf-8"?>
-<p:sld xmlns:a="http://schemas.openxmlformats.org/drawingml/2006/main" xmlns:r="http://schemas.openxmlformats.org/officeDocument/2006/relationships" xmlns:p="http://schemas.openxmlformats.org/presentationml/2006/main">
-  <p:cSld>
-    <p:spTree>
-      <p:nvGrpSpPr>
-        <p:cNvPr id="1" name=""/>
-        <p:cNvGrpSpPr/>
-        <p:nvPr/>
-      </p:nvGrpSpPr>
-      <p:grpSpPr>
-        <a:xfrm>
-          <a:off x="0" y="0"/>
-          <a:ext cx="0" cy="0"/>
-          <a:chOff x="0" y="0"/>
-          <a:chExt cx="0" cy="0"/>
-        </a:xfrm>
-      </p:grpSpPr>
+      <p:sp>
+        <p:nvSpPr>
+          <p:cNvPr id="8" name="Rectangle 7"/>
+          <p:cNvSpPr/>
+          <p:nvPr/>
+        </p:nvSpPr>
+        <p:spPr>
+          <a:xfrm>
+            <a:off x="3657600" y="2667000"/>
+            <a:ext cx="1981200" cy="533400"/>
+          </a:xfrm>
+          <a:prstGeom prst="rect">
+            <a:avLst/>
+          </a:prstGeom>
+        </p:spPr>
+        <p:style>
+          <a:lnRef idx="2">
+            <a:schemeClr val="accent1">
+              <a:shade val="50000"/>
+            </a:schemeClr>
+          </a:lnRef>
+          <a:fillRef idx="1">
+            <a:schemeClr val="accent1"/>
+          </a:fillRef>
+          <a:effectRef idx="0">
+            <a:schemeClr val="accent1"/>
+          </a:effectRef>
+          <a:fontRef idx="minor">
+            <a:schemeClr val="lt1"/>
+          </a:fontRef>
+        </p:style>
+        <p:txBody>
+          <a:bodyPr rtlCol="0" anchor="ctr"/>
+          <a:lstStyle/>
+          <a:p>
+            <a:pPr algn="ctr"/>
+            <a:r>
+              <a:rPr lang="en-US" dirty="0" smtClean="0"/>
+              <a:t>Load</a:t>
+            </a:r>
+            <a:endParaRPr lang="en-US" dirty="0"/>
+          </a:p>
+        </p:txBody>
+      </p:sp>
+      <p:sp>
+        <p:nvSpPr>
+          <p:cNvPr id="9" name="Rectangle 8"/>
+          <p:cNvSpPr/>
+          <p:nvPr/>
+        </p:nvSpPr>
+        <p:spPr>
+          <a:xfrm>
+            <a:off x="3657600" y="3352800"/>
+            <a:ext cx="1981200" cy="533400"/>
+          </a:xfrm>
+          <a:prstGeom prst="rect">
+            <a:avLst/>
+          </a:prstGeom>
+        </p:spPr>
+        <p:style>
+          <a:lnRef idx="2">
+            <a:schemeClr val="accent1">
+              <a:shade val="50000"/>
+            </a:schemeClr>
+          </a:lnRef>
+          <a:fillRef idx="1">
+            <a:schemeClr val="accent1"/>
+          </a:fillRef>
+          <a:effectRef idx="0">
+            <a:schemeClr val="accent1"/>
+          </a:effectRef>
+          <a:fontRef idx="minor">
+            <a:schemeClr val="lt1"/>
+          </a:fontRef>
+        </p:style>
+        <p:txBody>
+          <a:bodyPr rtlCol="0" anchor="ctr"/>
+          <a:lstStyle/>
+          <a:p>
+            <a:pPr algn="ctr"/>
+            <a:r>
+              <a:rPr lang="en-US" dirty="0" smtClean="0"/>
+              <a:t>Quit to Main Menu</a:t>
+            </a:r>
+            <a:endParaRPr lang="en-US" dirty="0"/>
+          </a:p>
+        </p:txBody>
+      </p:sp>
+      <p:sp>
+        <p:nvSpPr>
+          <p:cNvPr id="10" name="Rectangle 9"/>
+          <p:cNvSpPr/>
+          <p:nvPr/>
+        </p:nvSpPr>
+        <p:spPr>
+          <a:xfrm>
+            <a:off x="3657600" y="4038600"/>
+            <a:ext cx="1981200" cy="533400"/>
+          </a:xfrm>
+          <a:prstGeom prst="rect">
+            <a:avLst/>
+          </a:prstGeom>
+        </p:spPr>
+        <p:style>
+          <a:lnRef idx="2">
+            <a:schemeClr val="accent1">
+              <a:shade val="50000"/>
+            </a:schemeClr>
+          </a:lnRef>
+          <a:fillRef idx="1">
+            <a:schemeClr val="accent1"/>
+          </a:fillRef>
+          <a:effectRef idx="0">
+            <a:schemeClr val="accent1"/>
+          </a:effectRef>
+          <a:fontRef idx="minor">
+            <a:schemeClr val="lt1"/>
+          </a:fontRef>
+        </p:style>
+        <p:txBody>
+          <a:bodyPr rtlCol="0" anchor="ctr"/>
+          <a:lstStyle/>
+          <a:p>
+            <a:pPr algn="ctr"/>
+            <a:r>
+              <a:rPr lang="en-US" dirty="0" smtClean="0"/>
+              <a:t>Quit to Desktop</a:t>
+            </a:r>
+            <a:endParaRPr lang="en-US" dirty="0"/>
+          </a:p>
+        </p:txBody>
+      </p:sp>
     </p:spTree>
   </p:cSld>
   <p:clrMapOvr>
@@ -27262,14 +27564,7 @@
           <a:prstGeom prst="rect">
             <a:avLst/>
           </a:prstGeom>
-          <a:solidFill>
-            <a:srgbClr val="FFFF00"/>
-          </a:solidFill>
-          <a:ln>
-            <a:solidFill>
-              <a:srgbClr val="FFC000"/>
-            </a:solidFill>
-          </a:ln>
+          <a:ln/>
         </p:spPr>
         <p:style>
           <a:lnRef idx="2">
@@ -29548,14 +29843,7 @@
           <a:prstGeom prst="rect">
             <a:avLst/>
           </a:prstGeom>
-          <a:solidFill>
-            <a:srgbClr val="FFFF00"/>
-          </a:solidFill>
-          <a:ln>
-            <a:solidFill>
-              <a:srgbClr val="FFC000"/>
-            </a:solidFill>
-          </a:ln>
+          <a:ln/>
         </p:spPr>
         <p:style>
           <a:lnRef idx="2">
@@ -29596,14 +29884,7 @@
           <a:prstGeom prst="rect">
             <a:avLst/>
           </a:prstGeom>
-          <a:solidFill>
-            <a:srgbClr val="FFFF00"/>
-          </a:solidFill>
-          <a:ln>
-            <a:solidFill>
-              <a:srgbClr val="FFC000"/>
-            </a:solidFill>
-          </a:ln>
+          <a:ln/>
         </p:spPr>
         <p:style>
           <a:lnRef idx="2">
@@ -29644,14 +29925,7 @@
           <a:prstGeom prst="rect">
             <a:avLst/>
           </a:prstGeom>
-          <a:solidFill>
-            <a:srgbClr val="FFFF00"/>
-          </a:solidFill>
-          <a:ln>
-            <a:solidFill>
-              <a:srgbClr val="FFC000"/>
-            </a:solidFill>
-          </a:ln>
+          <a:ln/>
         </p:spPr>
         <p:style>
           <a:lnRef idx="2">
@@ -30476,6 +30750,94 @@
           <a:effectLst/>
         </p:spPr>
       </p:pic>
+      <p:sp>
+        <p:nvSpPr>
+          <p:cNvPr id="135" name="Oval 134"/>
+          <p:cNvSpPr/>
+          <p:nvPr/>
+        </p:nvSpPr>
+        <p:spPr>
+          <a:xfrm>
+            <a:off x="4038600" y="2895600"/>
+            <a:ext cx="304800" cy="304800"/>
+          </a:xfrm>
+          <a:prstGeom prst="ellipse">
+            <a:avLst/>
+          </a:prstGeom>
+        </p:spPr>
+        <p:style>
+          <a:lnRef idx="2">
+            <a:schemeClr val="accent6">
+              <a:shade val="50000"/>
+            </a:schemeClr>
+          </a:lnRef>
+          <a:fillRef idx="1">
+            <a:schemeClr val="accent6"/>
+          </a:fillRef>
+          <a:effectRef idx="0">
+            <a:schemeClr val="accent6"/>
+          </a:effectRef>
+          <a:fontRef idx="minor">
+            <a:schemeClr val="lt1"/>
+          </a:fontRef>
+        </p:style>
+        <p:txBody>
+          <a:bodyPr rtlCol="0" anchor="ctr"/>
+          <a:lstStyle/>
+          <a:p>
+            <a:pPr algn="ctr"/>
+            <a:r>
+              <a:rPr lang="en-US" dirty="0" smtClean="0"/>
+              <a:t>!</a:t>
+            </a:r>
+            <a:endParaRPr lang="en-US" dirty="0"/>
+          </a:p>
+        </p:txBody>
+      </p:sp>
+      <p:sp>
+        <p:nvSpPr>
+          <p:cNvPr id="137" name="Oval 136"/>
+          <p:cNvSpPr/>
+          <p:nvPr/>
+        </p:nvSpPr>
+        <p:spPr>
+          <a:xfrm>
+            <a:off x="5181600" y="2514600"/>
+            <a:ext cx="304800" cy="304800"/>
+          </a:xfrm>
+          <a:prstGeom prst="ellipse">
+            <a:avLst/>
+          </a:prstGeom>
+        </p:spPr>
+        <p:style>
+          <a:lnRef idx="2">
+            <a:schemeClr val="accent6">
+              <a:shade val="50000"/>
+            </a:schemeClr>
+          </a:lnRef>
+          <a:fillRef idx="1">
+            <a:schemeClr val="accent6"/>
+          </a:fillRef>
+          <a:effectRef idx="0">
+            <a:schemeClr val="accent6"/>
+          </a:effectRef>
+          <a:fontRef idx="minor">
+            <a:schemeClr val="lt1"/>
+          </a:fontRef>
+        </p:style>
+        <p:txBody>
+          <a:bodyPr rtlCol="0" anchor="ctr"/>
+          <a:lstStyle/>
+          <a:p>
+            <a:pPr algn="ctr"/>
+            <a:r>
+              <a:rPr lang="en-US" dirty="0" smtClean="0"/>
+              <a:t>!</a:t>
+            </a:r>
+            <a:endParaRPr lang="en-US" dirty="0"/>
+          </a:p>
+        </p:txBody>
+      </p:sp>
     </p:spTree>
   </p:cSld>
   <p:clrMapOvr>

</xml_diff>

<commit_message>
Edited some documentation, tweaked a psd file.
</commit_message>
<xml_diff>
--- a/Documents/Bel Nix Wireframes.pptx
+++ b/Documents/Bel Nix Wireframes.pptx
@@ -14,8 +14,8 @@
     <p:sldId id="266" r:id="rId8"/>
     <p:sldId id="268" r:id="rId9"/>
     <p:sldId id="283" r:id="rId10"/>
-    <p:sldId id="270" r:id="rId11"/>
-    <p:sldId id="260" r:id="rId12"/>
+    <p:sldId id="260" r:id="rId11"/>
+    <p:sldId id="270" r:id="rId12"/>
     <p:sldId id="261" r:id="rId13"/>
     <p:sldId id="262" r:id="rId14"/>
     <p:sldId id="263" r:id="rId15"/>
@@ -126,6 +126,22 @@
       </a:defRPr>
     </a:lvl9pPr>
   </p:defaultTextStyle>
+  <p:extLst>
+    <p:ext uri="{EFAFB233-063F-42B5-8137-9DF3F51BA10A}">
+      <p15:sldGuideLst xmlns:p15="http://schemas.microsoft.com/office/powerpoint/2012/main">
+        <p15:guide id="1" orient="horz" pos="2160">
+          <p15:clr>
+            <a:srgbClr val="A4A3A4"/>
+          </p15:clr>
+        </p15:guide>
+        <p15:guide id="2" pos="2880">
+          <p15:clr>
+            <a:srgbClr val="A4A3A4"/>
+          </p15:clr>
+        </p15:guide>
+      </p15:sldGuideLst>
+    </p:ext>
+  </p:extLst>
 </p:presentation>
 </file>
 
@@ -311,7 +327,7 @@
             <a:fld id="{DFEB74F4-18E0-45A9-BC28-087929DA7966}" type="datetimeFigureOut">
               <a:rPr lang="en-US" smtClean="0"/>
               <a:pPr/>
-              <a:t>11/8/2014</a:t>
+              <a:t>11/16/2014</a:t>
             </a:fld>
             <a:endParaRPr lang="en-US"/>
           </a:p>
@@ -478,7 +494,7 @@
             <a:fld id="{DFEB74F4-18E0-45A9-BC28-087929DA7966}" type="datetimeFigureOut">
               <a:rPr lang="en-US" smtClean="0"/>
               <a:pPr/>
-              <a:t>11/8/2014</a:t>
+              <a:t>11/16/2014</a:t>
             </a:fld>
             <a:endParaRPr lang="en-US"/>
           </a:p>
@@ -655,7 +671,7 @@
             <a:fld id="{DFEB74F4-18E0-45A9-BC28-087929DA7966}" type="datetimeFigureOut">
               <a:rPr lang="en-US" smtClean="0"/>
               <a:pPr/>
-              <a:t>11/8/2014</a:t>
+              <a:t>11/16/2014</a:t>
             </a:fld>
             <a:endParaRPr lang="en-US"/>
           </a:p>
@@ -822,7 +838,7 @@
             <a:fld id="{DFEB74F4-18E0-45A9-BC28-087929DA7966}" type="datetimeFigureOut">
               <a:rPr lang="en-US" smtClean="0"/>
               <a:pPr/>
-              <a:t>11/8/2014</a:t>
+              <a:t>11/16/2014</a:t>
             </a:fld>
             <a:endParaRPr lang="en-US"/>
           </a:p>
@@ -1065,7 +1081,7 @@
             <a:fld id="{DFEB74F4-18E0-45A9-BC28-087929DA7966}" type="datetimeFigureOut">
               <a:rPr lang="en-US" smtClean="0"/>
               <a:pPr/>
-              <a:t>11/8/2014</a:t>
+              <a:t>11/16/2014</a:t>
             </a:fld>
             <a:endParaRPr lang="en-US"/>
           </a:p>
@@ -1350,7 +1366,7 @@
             <a:fld id="{DFEB74F4-18E0-45A9-BC28-087929DA7966}" type="datetimeFigureOut">
               <a:rPr lang="en-US" smtClean="0"/>
               <a:pPr/>
-              <a:t>11/8/2014</a:t>
+              <a:t>11/16/2014</a:t>
             </a:fld>
             <a:endParaRPr lang="en-US"/>
           </a:p>
@@ -1769,7 +1785,7 @@
             <a:fld id="{DFEB74F4-18E0-45A9-BC28-087929DA7966}" type="datetimeFigureOut">
               <a:rPr lang="en-US" smtClean="0"/>
               <a:pPr/>
-              <a:t>11/8/2014</a:t>
+              <a:t>11/16/2014</a:t>
             </a:fld>
             <a:endParaRPr lang="en-US"/>
           </a:p>
@@ -1884,7 +1900,7 @@
             <a:fld id="{DFEB74F4-18E0-45A9-BC28-087929DA7966}" type="datetimeFigureOut">
               <a:rPr lang="en-US" smtClean="0"/>
               <a:pPr/>
-              <a:t>11/8/2014</a:t>
+              <a:t>11/16/2014</a:t>
             </a:fld>
             <a:endParaRPr lang="en-US"/>
           </a:p>
@@ -1976,7 +1992,7 @@
             <a:fld id="{DFEB74F4-18E0-45A9-BC28-087929DA7966}" type="datetimeFigureOut">
               <a:rPr lang="en-US" smtClean="0"/>
               <a:pPr/>
-              <a:t>11/8/2014</a:t>
+              <a:t>11/16/2014</a:t>
             </a:fld>
             <a:endParaRPr lang="en-US"/>
           </a:p>
@@ -2250,7 +2266,7 @@
             <a:fld id="{DFEB74F4-18E0-45A9-BC28-087929DA7966}" type="datetimeFigureOut">
               <a:rPr lang="en-US" smtClean="0"/>
               <a:pPr/>
-              <a:t>11/8/2014</a:t>
+              <a:t>11/16/2014</a:t>
             </a:fld>
             <a:endParaRPr lang="en-US"/>
           </a:p>
@@ -2500,7 +2516,7 @@
             <a:fld id="{DFEB74F4-18E0-45A9-BC28-087929DA7966}" type="datetimeFigureOut">
               <a:rPr lang="en-US" smtClean="0"/>
               <a:pPr/>
-              <a:t>11/8/2014</a:t>
+              <a:t>11/16/2014</a:t>
             </a:fld>
             <a:endParaRPr lang="en-US"/>
           </a:p>
@@ -2710,7 +2726,7 @@
             <a:fld id="{DFEB74F4-18E0-45A9-BC28-087929DA7966}" type="datetimeFigureOut">
               <a:rPr lang="en-US" smtClean="0"/>
               <a:pPr/>
-              <a:t>11/8/2014</a:t>
+              <a:t>11/16/2014</a:t>
             </a:fld>
             <a:endParaRPr lang="en-US"/>
           </a:p>
@@ -3131,28 +3147,841 @@
       </p:grpSpPr>
       <p:sp>
         <p:nvSpPr>
-          <p:cNvPr id="2" name="Title 1"/>
-          <p:cNvSpPr>
-            <a:spLocks noGrp="1"/>
-          </p:cNvSpPr>
-          <p:nvPr>
-            <p:ph type="ctrTitle"/>
-          </p:nvPr>
-        </p:nvSpPr>
-        <p:spPr/>
-        <p:txBody>
-          <a:bodyPr/>
-          <a:lstStyle/>
-          <a:p>
+          <p:cNvPr id="13" name="Rounded Rectangle 12"/>
+          <p:cNvSpPr/>
+          <p:nvPr/>
+        </p:nvSpPr>
+        <p:spPr>
+          <a:xfrm>
+            <a:off x="1587500" y="4800600"/>
+            <a:ext cx="1674495" cy="2057400"/>
+          </a:xfrm>
+          <a:prstGeom prst="roundRect">
+            <a:avLst/>
+          </a:prstGeom>
+          <a:solidFill>
+            <a:schemeClr val="accent1">
+              <a:lumMod val="75000"/>
+            </a:schemeClr>
+          </a:solidFill>
+        </p:spPr>
+        <p:style>
+          <a:lnRef idx="2">
+            <a:schemeClr val="accent1">
+              <a:shade val="50000"/>
+            </a:schemeClr>
+          </a:lnRef>
+          <a:fillRef idx="1">
+            <a:schemeClr val="accent1"/>
+          </a:fillRef>
+          <a:effectRef idx="0">
+            <a:schemeClr val="accent1"/>
+          </a:effectRef>
+          <a:fontRef idx="minor">
+            <a:schemeClr val="lt1"/>
+          </a:fontRef>
+        </p:style>
+        <p:txBody>
+          <a:bodyPr rtlCol="0" anchor="ctr"/>
+          <a:lstStyle/>
+          <a:p>
+            <a:pPr algn="ctr"/>
             <a:r>
               <a:rPr lang="en-US" dirty="0" smtClean="0"/>
-              <a:t>Character Sheet</a:t>
+              <a:t>Attack</a:t>
+            </a:r>
+          </a:p>
+          <a:p>
+            <a:pPr algn="ctr"/>
+            <a:r>
+              <a:rPr lang="en-US" dirty="0" smtClean="0"/>
+              <a:t>Inventory</a:t>
+            </a:r>
+          </a:p>
+          <a:p>
+            <a:pPr algn="ctr"/>
+            <a:r>
+              <a:rPr lang="en-US" dirty="0" smtClean="0"/>
+              <a:t>Throw</a:t>
+            </a:r>
+          </a:p>
+          <a:p>
+            <a:pPr algn="ctr"/>
+            <a:r>
+              <a:rPr lang="en-US" dirty="0" smtClean="0"/>
+              <a:t>  Into the Fray</a:t>
+            </a:r>
+          </a:p>
+          <a:p>
+            <a:pPr algn="ctr"/>
+            <a:r>
+              <a:rPr lang="en-US" dirty="0" smtClean="0"/>
+              <a:t>Back</a:t>
+            </a:r>
+          </a:p>
+        </p:txBody>
+      </p:sp>
+      <p:sp>
+        <p:nvSpPr>
+          <p:cNvPr id="4" name="Parallelogram 3"/>
+          <p:cNvSpPr/>
+          <p:nvPr/>
+        </p:nvSpPr>
+        <p:spPr>
+          <a:xfrm>
+            <a:off x="0" y="0"/>
+            <a:ext cx="4572000" cy="914400"/>
+          </a:xfrm>
+          <a:prstGeom prst="parallelogram">
+            <a:avLst>
+              <a:gd name="adj" fmla="val 26704"/>
+            </a:avLst>
+          </a:prstGeom>
+        </p:spPr>
+        <p:style>
+          <a:lnRef idx="2">
+            <a:schemeClr val="accent1">
+              <a:shade val="50000"/>
+            </a:schemeClr>
+          </a:lnRef>
+          <a:fillRef idx="1">
+            <a:schemeClr val="accent1"/>
+          </a:fillRef>
+          <a:effectRef idx="0">
+            <a:schemeClr val="accent1"/>
+          </a:effectRef>
+          <a:fontRef idx="minor">
+            <a:schemeClr val="lt1"/>
+          </a:fontRef>
+        </p:style>
+        <p:txBody>
+          <a:bodyPr rtlCol="0" anchor="ctr"/>
+          <a:lstStyle/>
+          <a:p>
+            <a:pPr algn="r"/>
+            <a:r>
+              <a:rPr lang="en-US" dirty="0" smtClean="0">
+                <a:solidFill>
+                  <a:srgbClr val="C00000"/>
+                </a:solidFill>
+              </a:rPr>
+              <a:t>-----------------------Health</a:t>
+            </a:r>
+          </a:p>
+          <a:p>
+            <a:pPr algn="r"/>
+            <a:r>
+              <a:rPr lang="en-US" dirty="0" smtClean="0">
+                <a:solidFill>
+                  <a:srgbClr val="7030A0"/>
+                </a:solidFill>
+              </a:rPr>
+              <a:t>-----------------Composure</a:t>
+            </a:r>
+            <a:endParaRPr lang="en-US" dirty="0">
+              <a:solidFill>
+                <a:srgbClr val="7030A0"/>
+              </a:solidFill>
+            </a:endParaRPr>
+          </a:p>
+        </p:txBody>
+      </p:sp>
+      <p:sp>
+        <p:nvSpPr>
+          <p:cNvPr id="3" name="Rectangle 2"/>
+          <p:cNvSpPr/>
+          <p:nvPr/>
+        </p:nvSpPr>
+        <p:spPr>
+          <a:xfrm>
+            <a:off x="0" y="0"/>
+            <a:ext cx="1223010" cy="918482"/>
+          </a:xfrm>
+          <a:prstGeom prst="rect">
+            <a:avLst/>
+          </a:prstGeom>
+        </p:spPr>
+        <p:style>
+          <a:lnRef idx="2">
+            <a:schemeClr val="accent1">
+              <a:shade val="50000"/>
+            </a:schemeClr>
+          </a:lnRef>
+          <a:fillRef idx="1">
+            <a:schemeClr val="accent1"/>
+          </a:fillRef>
+          <a:effectRef idx="0">
+            <a:schemeClr val="accent1"/>
+          </a:effectRef>
+          <a:fontRef idx="minor">
+            <a:schemeClr val="lt1"/>
+          </a:fontRef>
+        </p:style>
+        <p:txBody>
+          <a:bodyPr rtlCol="0" anchor="ctr"/>
+          <a:lstStyle/>
+          <a:p>
+            <a:pPr algn="ctr"/>
+            <a:r>
+              <a:rPr lang="en-US" dirty="0" smtClean="0"/>
+              <a:t>Portrait</a:t>
             </a:r>
             <a:endParaRPr lang="en-US" dirty="0"/>
           </a:p>
         </p:txBody>
       </p:sp>
+      <p:sp>
+        <p:nvSpPr>
+          <p:cNvPr id="5" name="Rectangle 4"/>
+          <p:cNvSpPr/>
+          <p:nvPr/>
+        </p:nvSpPr>
+        <p:spPr>
+          <a:xfrm>
+            <a:off x="0" y="923562"/>
+            <a:ext cx="609600" cy="609600"/>
+          </a:xfrm>
+          <a:prstGeom prst="rect">
+            <a:avLst/>
+          </a:prstGeom>
+          <a:ln>
+            <a:solidFill>
+              <a:schemeClr val="accent1">
+                <a:lumMod val="50000"/>
+              </a:schemeClr>
+            </a:solidFill>
+          </a:ln>
+        </p:spPr>
+        <p:style>
+          <a:lnRef idx="2">
+            <a:schemeClr val="accent1">
+              <a:shade val="50000"/>
+            </a:schemeClr>
+          </a:lnRef>
+          <a:fillRef idx="1">
+            <a:schemeClr val="accent1"/>
+          </a:fillRef>
+          <a:effectRef idx="0">
+            <a:schemeClr val="accent1"/>
+          </a:effectRef>
+          <a:fontRef idx="minor">
+            <a:schemeClr val="lt1"/>
+          </a:fontRef>
+        </p:style>
+        <p:txBody>
+          <a:bodyPr rtlCol="0" anchor="ctr"/>
+          <a:lstStyle/>
+          <a:p>
+            <a:pPr algn="ctr"/>
+            <a:r>
+              <a:rPr lang="en-US" dirty="0" smtClean="0"/>
+              <a:t>M</a:t>
+            </a:r>
+            <a:endParaRPr lang="en-US" dirty="0"/>
+          </a:p>
+        </p:txBody>
+      </p:sp>
+      <p:sp>
+        <p:nvSpPr>
+          <p:cNvPr id="6" name="Rectangle 5"/>
+          <p:cNvSpPr/>
+          <p:nvPr/>
+        </p:nvSpPr>
+        <p:spPr>
+          <a:xfrm>
+            <a:off x="609600" y="923562"/>
+            <a:ext cx="609600" cy="609600"/>
+          </a:xfrm>
+          <a:prstGeom prst="rect">
+            <a:avLst/>
+          </a:prstGeom>
+          <a:ln>
+            <a:solidFill>
+              <a:schemeClr val="accent1">
+                <a:lumMod val="50000"/>
+              </a:schemeClr>
+            </a:solidFill>
+          </a:ln>
+        </p:spPr>
+        <p:style>
+          <a:lnRef idx="2">
+            <a:schemeClr val="accent1">
+              <a:shade val="50000"/>
+            </a:schemeClr>
+          </a:lnRef>
+          <a:fillRef idx="1">
+            <a:schemeClr val="accent1"/>
+          </a:fillRef>
+          <a:effectRef idx="0">
+            <a:schemeClr val="accent1"/>
+          </a:effectRef>
+          <a:fontRef idx="minor">
+            <a:schemeClr val="lt1"/>
+          </a:fontRef>
+        </p:style>
+        <p:txBody>
+          <a:bodyPr rtlCol="0" anchor="ctr"/>
+          <a:lstStyle/>
+          <a:p>
+            <a:pPr algn="ctr"/>
+            <a:r>
+              <a:rPr lang="en-US" dirty="0" smtClean="0"/>
+              <a:t>C</a:t>
+            </a:r>
+            <a:endParaRPr lang="en-US" dirty="0"/>
+          </a:p>
+        </p:txBody>
+      </p:sp>
+      <p:sp>
+        <p:nvSpPr>
+          <p:cNvPr id="7" name="Rectangle 6"/>
+          <p:cNvSpPr/>
+          <p:nvPr/>
+        </p:nvSpPr>
+        <p:spPr>
+          <a:xfrm>
+            <a:off x="1223010" y="923562"/>
+            <a:ext cx="609600" cy="609600"/>
+          </a:xfrm>
+          <a:prstGeom prst="rect">
+            <a:avLst/>
+          </a:prstGeom>
+          <a:ln>
+            <a:solidFill>
+              <a:schemeClr val="accent1">
+                <a:lumMod val="50000"/>
+              </a:schemeClr>
+            </a:solidFill>
+          </a:ln>
+        </p:spPr>
+        <p:style>
+          <a:lnRef idx="2">
+            <a:schemeClr val="accent1">
+              <a:shade val="50000"/>
+            </a:schemeClr>
+          </a:lnRef>
+          <a:fillRef idx="1">
+            <a:schemeClr val="accent1"/>
+          </a:fillRef>
+          <a:effectRef idx="0">
+            <a:schemeClr val="accent1"/>
+          </a:effectRef>
+          <a:fontRef idx="minor">
+            <a:schemeClr val="lt1"/>
+          </a:fontRef>
+        </p:style>
+        <p:txBody>
+          <a:bodyPr rtlCol="0" anchor="ctr"/>
+          <a:lstStyle/>
+          <a:p>
+            <a:pPr algn="ctr"/>
+            <a:r>
+              <a:rPr lang="en-US" dirty="0" smtClean="0"/>
+              <a:t>K</a:t>
+            </a:r>
+            <a:endParaRPr lang="en-US" dirty="0"/>
+          </a:p>
+        </p:txBody>
+      </p:sp>
+      <p:sp>
+        <p:nvSpPr>
+          <p:cNvPr id="8" name="Rectangle 7"/>
+          <p:cNvSpPr/>
+          <p:nvPr/>
+        </p:nvSpPr>
+        <p:spPr>
+          <a:xfrm>
+            <a:off x="1832610" y="923562"/>
+            <a:ext cx="609600" cy="609600"/>
+          </a:xfrm>
+          <a:prstGeom prst="rect">
+            <a:avLst/>
+          </a:prstGeom>
+          <a:ln>
+            <a:solidFill>
+              <a:schemeClr val="accent1">
+                <a:lumMod val="50000"/>
+              </a:schemeClr>
+            </a:solidFill>
+          </a:ln>
+        </p:spPr>
+        <p:style>
+          <a:lnRef idx="2">
+            <a:schemeClr val="accent1">
+              <a:shade val="50000"/>
+            </a:schemeClr>
+          </a:lnRef>
+          <a:fillRef idx="1">
+            <a:schemeClr val="accent1"/>
+          </a:fillRef>
+          <a:effectRef idx="0">
+            <a:schemeClr val="accent1"/>
+          </a:effectRef>
+          <a:fontRef idx="minor">
+            <a:schemeClr val="lt1"/>
+          </a:fontRef>
+        </p:style>
+        <p:txBody>
+          <a:bodyPr rtlCol="0" anchor="ctr"/>
+          <a:lstStyle/>
+          <a:p>
+            <a:pPr algn="ctr"/>
+            <a:r>
+              <a:rPr lang="en-US" dirty="0" smtClean="0"/>
+              <a:t>I</a:t>
+            </a:r>
+            <a:endParaRPr lang="en-US" dirty="0"/>
+          </a:p>
+        </p:txBody>
+      </p:sp>
+      <p:sp>
+        <p:nvSpPr>
+          <p:cNvPr id="9" name="Rectangle 8"/>
+          <p:cNvSpPr/>
+          <p:nvPr/>
+        </p:nvSpPr>
+        <p:spPr>
+          <a:xfrm>
+            <a:off x="2442210" y="923562"/>
+            <a:ext cx="609600" cy="609600"/>
+          </a:xfrm>
+          <a:prstGeom prst="rect">
+            <a:avLst/>
+          </a:prstGeom>
+          <a:ln>
+            <a:solidFill>
+              <a:schemeClr val="accent1">
+                <a:lumMod val="50000"/>
+              </a:schemeClr>
+            </a:solidFill>
+          </a:ln>
+        </p:spPr>
+        <p:style>
+          <a:lnRef idx="2">
+            <a:schemeClr val="accent1">
+              <a:shade val="50000"/>
+            </a:schemeClr>
+          </a:lnRef>
+          <a:fillRef idx="1">
+            <a:schemeClr val="accent1"/>
+          </a:fillRef>
+          <a:effectRef idx="0">
+            <a:schemeClr val="accent1"/>
+          </a:effectRef>
+          <a:fontRef idx="minor">
+            <a:schemeClr val="lt1"/>
+          </a:fontRef>
+        </p:style>
+        <p:txBody>
+          <a:bodyPr rtlCol="0" anchor="ctr"/>
+          <a:lstStyle/>
+          <a:p>
+            <a:pPr algn="ctr"/>
+            <a:r>
+              <a:rPr lang="en-US" dirty="0" smtClean="0"/>
+              <a:t>T</a:t>
+            </a:r>
+            <a:endParaRPr lang="en-US" dirty="0"/>
+          </a:p>
+        </p:txBody>
+      </p:sp>
+      <p:sp>
+        <p:nvSpPr>
+          <p:cNvPr id="10" name="Rectangle 9"/>
+          <p:cNvSpPr/>
+          <p:nvPr/>
+        </p:nvSpPr>
+        <p:spPr>
+          <a:xfrm>
+            <a:off x="8625948" y="0"/>
+            <a:ext cx="518052" cy="518052"/>
+          </a:xfrm>
+          <a:prstGeom prst="rect">
+            <a:avLst/>
+          </a:prstGeom>
+        </p:spPr>
+        <p:style>
+          <a:lnRef idx="2">
+            <a:schemeClr val="accent1">
+              <a:shade val="50000"/>
+            </a:schemeClr>
+          </a:lnRef>
+          <a:fillRef idx="1">
+            <a:schemeClr val="accent1"/>
+          </a:fillRef>
+          <a:effectRef idx="0">
+            <a:schemeClr val="accent1"/>
+          </a:effectRef>
+          <a:fontRef idx="minor">
+            <a:schemeClr val="lt1"/>
+          </a:fontRef>
+        </p:style>
+        <p:txBody>
+          <a:bodyPr rtlCol="0" anchor="ctr"/>
+          <a:lstStyle/>
+          <a:p>
+            <a:pPr algn="ctr"/>
+            <a:endParaRPr lang="en-US"/>
+          </a:p>
+        </p:txBody>
+      </p:sp>
+      <p:pic>
+        <p:nvPicPr>
+          <p:cNvPr id="1028" name="Picture 4" descr="C:\Users\Connor\AppData\Local\Microsoft\Windows\Temporary Internet Files\Content.IE5\5G0X10PF\MC900434742[1].png"/>
+          <p:cNvPicPr>
+            <a:picLocks noChangeAspect="1" noChangeArrowheads="1"/>
+          </p:cNvPicPr>
+          <p:nvPr/>
+        </p:nvPicPr>
+        <p:blipFill>
+          <a:blip r:embed="rId2" cstate="print">
+            <a:extLst>
+              <a:ext uri="{28A0092B-C50C-407E-A947-70E740481C1C}">
+                <a14:useLocalDpi xmlns:a14="http://schemas.microsoft.com/office/drawing/2010/main" val="0"/>
+              </a:ext>
+            </a:extLst>
+          </a:blip>
+          <a:srcRect/>
+          <a:stretch>
+            <a:fillRect/>
+          </a:stretch>
+        </p:blipFill>
+        <p:spPr bwMode="auto">
+          <a:xfrm>
+            <a:off x="8648771" y="22823"/>
+            <a:ext cx="472405" cy="472405"/>
+          </a:xfrm>
+          <a:prstGeom prst="rect">
+            <a:avLst/>
+          </a:prstGeom>
+          <a:noFill/>
+          <a:extLst>
+            <a:ext uri="{909E8E84-426E-40DD-AFC4-6F175D3DCCD1}">
+              <a14:hiddenFill xmlns:a14="http://schemas.microsoft.com/office/drawing/2010/main">
+                <a:solidFill>
+                  <a:srgbClr val="FFFFFF"/>
+                </a:solidFill>
+              </a14:hiddenFill>
+            </a:ext>
+          </a:extLst>
+        </p:spPr>
+      </p:pic>
+      <p:sp>
+        <p:nvSpPr>
+          <p:cNvPr id="14" name="Rectangle 13"/>
+          <p:cNvSpPr/>
+          <p:nvPr/>
+        </p:nvSpPr>
+        <p:spPr>
+          <a:xfrm>
+            <a:off x="8087576" y="0"/>
+            <a:ext cx="518052" cy="518052"/>
+          </a:xfrm>
+          <a:prstGeom prst="rect">
+            <a:avLst/>
+          </a:prstGeom>
+        </p:spPr>
+        <p:style>
+          <a:lnRef idx="2">
+            <a:schemeClr val="accent1">
+              <a:shade val="50000"/>
+            </a:schemeClr>
+          </a:lnRef>
+          <a:fillRef idx="1">
+            <a:schemeClr val="accent1"/>
+          </a:fillRef>
+          <a:effectRef idx="0">
+            <a:schemeClr val="accent1"/>
+          </a:effectRef>
+          <a:fontRef idx="minor">
+            <a:schemeClr val="lt1"/>
+          </a:fontRef>
+        </p:style>
+        <p:txBody>
+          <a:bodyPr rtlCol="0" anchor="ctr"/>
+          <a:lstStyle/>
+          <a:p>
+            <a:pPr algn="ctr"/>
+            <a:r>
+              <a:rPr lang="en-US" dirty="0" smtClean="0"/>
+              <a:t>?</a:t>
+            </a:r>
+            <a:endParaRPr lang="en-US" dirty="0"/>
+          </a:p>
+        </p:txBody>
+      </p:sp>
+      <p:sp>
+        <p:nvSpPr>
+          <p:cNvPr id="11" name="Rectangle 10"/>
+          <p:cNvSpPr/>
+          <p:nvPr/>
+        </p:nvSpPr>
+        <p:spPr>
+          <a:xfrm>
+            <a:off x="0" y="6324600"/>
+            <a:ext cx="1832610" cy="533400"/>
+          </a:xfrm>
+          <a:prstGeom prst="rect">
+            <a:avLst/>
+          </a:prstGeom>
+        </p:spPr>
+        <p:style>
+          <a:lnRef idx="2">
+            <a:schemeClr val="accent1">
+              <a:shade val="50000"/>
+            </a:schemeClr>
+          </a:lnRef>
+          <a:fillRef idx="1">
+            <a:schemeClr val="accent1"/>
+          </a:fillRef>
+          <a:effectRef idx="0">
+            <a:schemeClr val="accent1"/>
+          </a:effectRef>
+          <a:fontRef idx="minor">
+            <a:schemeClr val="lt1"/>
+          </a:fontRef>
+        </p:style>
+        <p:txBody>
+          <a:bodyPr rtlCol="0" anchor="ctr"/>
+          <a:lstStyle/>
+          <a:p>
+            <a:pPr algn="ctr"/>
+            <a:r>
+              <a:rPr lang="en-US" dirty="0" smtClean="0"/>
+              <a:t>Wait</a:t>
+            </a:r>
+            <a:endParaRPr lang="en-US" dirty="0"/>
+          </a:p>
+        </p:txBody>
+      </p:sp>
+      <p:sp>
+        <p:nvSpPr>
+          <p:cNvPr id="16" name="Rectangle 15"/>
+          <p:cNvSpPr/>
+          <p:nvPr/>
+        </p:nvSpPr>
+        <p:spPr>
+          <a:xfrm>
+            <a:off x="-1905" y="5791200"/>
+            <a:ext cx="1832610" cy="533400"/>
+          </a:xfrm>
+          <a:prstGeom prst="rect">
+            <a:avLst/>
+          </a:prstGeom>
+        </p:spPr>
+        <p:style>
+          <a:lnRef idx="2">
+            <a:schemeClr val="accent1">
+              <a:shade val="50000"/>
+            </a:schemeClr>
+          </a:lnRef>
+          <a:fillRef idx="1">
+            <a:schemeClr val="accent1"/>
+          </a:fillRef>
+          <a:effectRef idx="0">
+            <a:schemeClr val="accent1"/>
+          </a:effectRef>
+          <a:fontRef idx="minor">
+            <a:schemeClr val="lt1"/>
+          </a:fontRef>
+        </p:style>
+        <p:txBody>
+          <a:bodyPr rtlCol="0" anchor="ctr"/>
+          <a:lstStyle/>
+          <a:p>
+            <a:r>
+              <a:rPr lang="en-US" dirty="0" smtClean="0"/>
+              <a:t>    Minor</a:t>
+            </a:r>
+            <a:endParaRPr lang="en-US" dirty="0"/>
+          </a:p>
+        </p:txBody>
+      </p:sp>
+      <p:sp>
+        <p:nvSpPr>
+          <p:cNvPr id="12" name="Rectangle 11"/>
+          <p:cNvSpPr/>
+          <p:nvPr/>
+        </p:nvSpPr>
+        <p:spPr>
+          <a:xfrm>
+            <a:off x="990600" y="5842000"/>
+            <a:ext cx="609600" cy="152400"/>
+          </a:xfrm>
+          <a:prstGeom prst="rect">
+            <a:avLst/>
+          </a:prstGeom>
+          <a:solidFill>
+            <a:schemeClr val="bg1"/>
+          </a:solidFill>
+        </p:spPr>
+        <p:style>
+          <a:lnRef idx="2">
+            <a:schemeClr val="accent1">
+              <a:shade val="50000"/>
+            </a:schemeClr>
+          </a:lnRef>
+          <a:fillRef idx="1">
+            <a:schemeClr val="accent1"/>
+          </a:fillRef>
+          <a:effectRef idx="0">
+            <a:schemeClr val="accent1"/>
+          </a:effectRef>
+          <a:fontRef idx="minor">
+            <a:schemeClr val="lt1"/>
+          </a:fontRef>
+        </p:style>
+        <p:txBody>
+          <a:bodyPr rtlCol="0" anchor="ctr"/>
+          <a:lstStyle/>
+          <a:p>
+            <a:pPr algn="ctr"/>
+            <a:endParaRPr lang="en-US"/>
+          </a:p>
+        </p:txBody>
+      </p:sp>
+      <p:sp>
+        <p:nvSpPr>
+          <p:cNvPr id="18" name="Rectangle 17"/>
+          <p:cNvSpPr/>
+          <p:nvPr/>
+        </p:nvSpPr>
+        <p:spPr>
+          <a:xfrm>
+            <a:off x="990600" y="6088380"/>
+            <a:ext cx="609600" cy="152400"/>
+          </a:xfrm>
+          <a:prstGeom prst="rect">
+            <a:avLst/>
+          </a:prstGeom>
+          <a:solidFill>
+            <a:schemeClr val="bg1"/>
+          </a:solidFill>
+        </p:spPr>
+        <p:style>
+          <a:lnRef idx="2">
+            <a:schemeClr val="accent1">
+              <a:shade val="50000"/>
+            </a:schemeClr>
+          </a:lnRef>
+          <a:fillRef idx="1">
+            <a:schemeClr val="accent1"/>
+          </a:fillRef>
+          <a:effectRef idx="0">
+            <a:schemeClr val="accent1"/>
+          </a:effectRef>
+          <a:fontRef idx="minor">
+            <a:schemeClr val="lt1"/>
+          </a:fontRef>
+        </p:style>
+        <p:txBody>
+          <a:bodyPr rtlCol="0" anchor="ctr"/>
+          <a:lstStyle/>
+          <a:p>
+            <a:pPr algn="ctr"/>
+            <a:endParaRPr lang="en-US"/>
+          </a:p>
+        </p:txBody>
+      </p:sp>
+      <p:sp>
+        <p:nvSpPr>
+          <p:cNvPr id="19" name="Rectangle 18"/>
+          <p:cNvSpPr/>
+          <p:nvPr/>
+        </p:nvSpPr>
+        <p:spPr>
+          <a:xfrm>
+            <a:off x="-1905" y="5257800"/>
+            <a:ext cx="1832610" cy="533400"/>
+          </a:xfrm>
+          <a:prstGeom prst="rect">
+            <a:avLst/>
+          </a:prstGeom>
+          <a:solidFill>
+            <a:schemeClr val="accent1">
+              <a:lumMod val="50000"/>
+            </a:schemeClr>
+          </a:solidFill>
+        </p:spPr>
+        <p:style>
+          <a:lnRef idx="2">
+            <a:schemeClr val="accent1">
+              <a:shade val="50000"/>
+            </a:schemeClr>
+          </a:lnRef>
+          <a:fillRef idx="1">
+            <a:schemeClr val="accent1"/>
+          </a:fillRef>
+          <a:effectRef idx="0">
+            <a:schemeClr val="accent1"/>
+          </a:effectRef>
+          <a:fontRef idx="minor">
+            <a:schemeClr val="lt1"/>
+          </a:fontRef>
+        </p:style>
+        <p:txBody>
+          <a:bodyPr rtlCol="0" anchor="ctr"/>
+          <a:lstStyle/>
+          <a:p>
+            <a:pPr algn="ctr"/>
+            <a:r>
+              <a:rPr lang="en-US" dirty="0" smtClean="0"/>
+              <a:t>  Standard</a:t>
+            </a:r>
+            <a:endParaRPr lang="en-US" dirty="0"/>
+          </a:p>
+        </p:txBody>
+      </p:sp>
+      <p:sp>
+        <p:nvSpPr>
+          <p:cNvPr id="20" name="Rectangle 19"/>
+          <p:cNvSpPr/>
+          <p:nvPr/>
+        </p:nvSpPr>
+        <p:spPr>
+          <a:xfrm>
+            <a:off x="0" y="4724400"/>
+            <a:ext cx="1832610" cy="533400"/>
+          </a:xfrm>
+          <a:prstGeom prst="rect">
+            <a:avLst/>
+          </a:prstGeom>
+        </p:spPr>
+        <p:style>
+          <a:lnRef idx="2">
+            <a:schemeClr val="accent1">
+              <a:shade val="50000"/>
+            </a:schemeClr>
+          </a:lnRef>
+          <a:fillRef idx="1">
+            <a:schemeClr val="accent1"/>
+          </a:fillRef>
+          <a:effectRef idx="0">
+            <a:schemeClr val="accent1"/>
+          </a:effectRef>
+          <a:fontRef idx="minor">
+            <a:schemeClr val="lt1"/>
+          </a:fontRef>
+        </p:style>
+        <p:txBody>
+          <a:bodyPr rtlCol="0" anchor="ctr"/>
+          <a:lstStyle/>
+          <a:p>
+            <a:pPr algn="ctr"/>
+            <a:r>
+              <a:rPr lang="en-US" dirty="0" smtClean="0"/>
+              <a:t>  Movement</a:t>
+            </a:r>
+            <a:endParaRPr lang="en-US" dirty="0"/>
+          </a:p>
+        </p:txBody>
+      </p:sp>
     </p:spTree>
+    <p:extLst>
+      <p:ext uri="{BB962C8B-B14F-4D97-AF65-F5344CB8AC3E}">
+        <p14:creationId xmlns:p14="http://schemas.microsoft.com/office/powerpoint/2010/main" val="230200905"/>
+      </p:ext>
+    </p:extLst>
   </p:cSld>
   <p:clrMapOvr>
     <a:masterClrMapping/>
@@ -3179,841 +4008,28 @@
       </p:grpSpPr>
       <p:sp>
         <p:nvSpPr>
-          <p:cNvPr id="13" name="Rounded Rectangle 12"/>
-          <p:cNvSpPr/>
-          <p:nvPr/>
-        </p:nvSpPr>
-        <p:spPr>
-          <a:xfrm>
-            <a:off x="1587500" y="4800600"/>
-            <a:ext cx="1674495" cy="2057400"/>
-          </a:xfrm>
-          <a:prstGeom prst="roundRect">
-            <a:avLst/>
-          </a:prstGeom>
-          <a:solidFill>
-            <a:schemeClr val="accent1">
-              <a:lumMod val="75000"/>
-            </a:schemeClr>
-          </a:solidFill>
-        </p:spPr>
-        <p:style>
-          <a:lnRef idx="2">
-            <a:schemeClr val="accent1">
-              <a:shade val="50000"/>
-            </a:schemeClr>
-          </a:lnRef>
-          <a:fillRef idx="1">
-            <a:schemeClr val="accent1"/>
-          </a:fillRef>
-          <a:effectRef idx="0">
-            <a:schemeClr val="accent1"/>
-          </a:effectRef>
-          <a:fontRef idx="minor">
-            <a:schemeClr val="lt1"/>
-          </a:fontRef>
-        </p:style>
-        <p:txBody>
-          <a:bodyPr rtlCol="0" anchor="ctr"/>
-          <a:lstStyle/>
-          <a:p>
-            <a:pPr algn="ctr"/>
+          <p:cNvPr id="2" name="Title 1"/>
+          <p:cNvSpPr>
+            <a:spLocks noGrp="1"/>
+          </p:cNvSpPr>
+          <p:nvPr>
+            <p:ph type="ctrTitle"/>
+          </p:nvPr>
+        </p:nvSpPr>
+        <p:spPr/>
+        <p:txBody>
+          <a:bodyPr/>
+          <a:lstStyle/>
+          <a:p>
             <a:r>
               <a:rPr lang="en-US" dirty="0" smtClean="0"/>
-              <a:t>Attack</a:t>
-            </a:r>
-          </a:p>
-          <a:p>
-            <a:pPr algn="ctr"/>
-            <a:r>
-              <a:rPr lang="en-US" dirty="0" smtClean="0"/>
-              <a:t>Inventory</a:t>
-            </a:r>
-          </a:p>
-          <a:p>
-            <a:pPr algn="ctr"/>
-            <a:r>
-              <a:rPr lang="en-US" dirty="0" smtClean="0"/>
-              <a:t>Throw</a:t>
-            </a:r>
-          </a:p>
-          <a:p>
-            <a:pPr algn="ctr"/>
-            <a:r>
-              <a:rPr lang="en-US" dirty="0" smtClean="0"/>
-              <a:t>  Into the Fray</a:t>
-            </a:r>
-          </a:p>
-          <a:p>
-            <a:pPr algn="ctr"/>
-            <a:r>
-              <a:rPr lang="en-US" dirty="0" smtClean="0"/>
-              <a:t>Back</a:t>
-            </a:r>
-          </a:p>
-        </p:txBody>
-      </p:sp>
-      <p:sp>
-        <p:nvSpPr>
-          <p:cNvPr id="4" name="Parallelogram 3"/>
-          <p:cNvSpPr/>
-          <p:nvPr/>
-        </p:nvSpPr>
-        <p:spPr>
-          <a:xfrm>
-            <a:off x="0" y="0"/>
-            <a:ext cx="4572000" cy="914400"/>
-          </a:xfrm>
-          <a:prstGeom prst="parallelogram">
-            <a:avLst>
-              <a:gd name="adj" fmla="val 26704"/>
-            </a:avLst>
-          </a:prstGeom>
-        </p:spPr>
-        <p:style>
-          <a:lnRef idx="2">
-            <a:schemeClr val="accent1">
-              <a:shade val="50000"/>
-            </a:schemeClr>
-          </a:lnRef>
-          <a:fillRef idx="1">
-            <a:schemeClr val="accent1"/>
-          </a:fillRef>
-          <a:effectRef idx="0">
-            <a:schemeClr val="accent1"/>
-          </a:effectRef>
-          <a:fontRef idx="minor">
-            <a:schemeClr val="lt1"/>
-          </a:fontRef>
-        </p:style>
-        <p:txBody>
-          <a:bodyPr rtlCol="0" anchor="ctr"/>
-          <a:lstStyle/>
-          <a:p>
-            <a:pPr algn="r"/>
-            <a:r>
-              <a:rPr lang="en-US" dirty="0" smtClean="0">
-                <a:solidFill>
-                  <a:srgbClr val="C00000"/>
-                </a:solidFill>
-              </a:rPr>
-              <a:t>-----------------------Health</a:t>
-            </a:r>
-          </a:p>
-          <a:p>
-            <a:pPr algn="r"/>
-            <a:r>
-              <a:rPr lang="en-US" dirty="0" smtClean="0">
-                <a:solidFill>
-                  <a:srgbClr val="7030A0"/>
-                </a:solidFill>
-              </a:rPr>
-              <a:t>-----------------Composure</a:t>
-            </a:r>
-            <a:endParaRPr lang="en-US" dirty="0">
-              <a:solidFill>
-                <a:srgbClr val="7030A0"/>
-              </a:solidFill>
-            </a:endParaRPr>
-          </a:p>
-        </p:txBody>
-      </p:sp>
-      <p:sp>
-        <p:nvSpPr>
-          <p:cNvPr id="3" name="Rectangle 2"/>
-          <p:cNvSpPr/>
-          <p:nvPr/>
-        </p:nvSpPr>
-        <p:spPr>
-          <a:xfrm>
-            <a:off x="0" y="0"/>
-            <a:ext cx="1223010" cy="918482"/>
-          </a:xfrm>
-          <a:prstGeom prst="rect">
-            <a:avLst/>
-          </a:prstGeom>
-        </p:spPr>
-        <p:style>
-          <a:lnRef idx="2">
-            <a:schemeClr val="accent1">
-              <a:shade val="50000"/>
-            </a:schemeClr>
-          </a:lnRef>
-          <a:fillRef idx="1">
-            <a:schemeClr val="accent1"/>
-          </a:fillRef>
-          <a:effectRef idx="0">
-            <a:schemeClr val="accent1"/>
-          </a:effectRef>
-          <a:fontRef idx="minor">
-            <a:schemeClr val="lt1"/>
-          </a:fontRef>
-        </p:style>
-        <p:txBody>
-          <a:bodyPr rtlCol="0" anchor="ctr"/>
-          <a:lstStyle/>
-          <a:p>
-            <a:pPr algn="ctr"/>
-            <a:r>
-              <a:rPr lang="en-US" dirty="0" smtClean="0"/>
-              <a:t>Portrait</a:t>
+              <a:t>Character Sheet</a:t>
             </a:r>
             <a:endParaRPr lang="en-US" dirty="0"/>
           </a:p>
         </p:txBody>
       </p:sp>
-      <p:sp>
-        <p:nvSpPr>
-          <p:cNvPr id="5" name="Rectangle 4"/>
-          <p:cNvSpPr/>
-          <p:nvPr/>
-        </p:nvSpPr>
-        <p:spPr>
-          <a:xfrm>
-            <a:off x="0" y="923562"/>
-            <a:ext cx="609600" cy="609600"/>
-          </a:xfrm>
-          <a:prstGeom prst="rect">
-            <a:avLst/>
-          </a:prstGeom>
-          <a:ln>
-            <a:solidFill>
-              <a:schemeClr val="accent1">
-                <a:lumMod val="50000"/>
-              </a:schemeClr>
-            </a:solidFill>
-          </a:ln>
-        </p:spPr>
-        <p:style>
-          <a:lnRef idx="2">
-            <a:schemeClr val="accent1">
-              <a:shade val="50000"/>
-            </a:schemeClr>
-          </a:lnRef>
-          <a:fillRef idx="1">
-            <a:schemeClr val="accent1"/>
-          </a:fillRef>
-          <a:effectRef idx="0">
-            <a:schemeClr val="accent1"/>
-          </a:effectRef>
-          <a:fontRef idx="minor">
-            <a:schemeClr val="lt1"/>
-          </a:fontRef>
-        </p:style>
-        <p:txBody>
-          <a:bodyPr rtlCol="0" anchor="ctr"/>
-          <a:lstStyle/>
-          <a:p>
-            <a:pPr algn="ctr"/>
-            <a:r>
-              <a:rPr lang="en-US" dirty="0" smtClean="0"/>
-              <a:t>M</a:t>
-            </a:r>
-            <a:endParaRPr lang="en-US" dirty="0"/>
-          </a:p>
-        </p:txBody>
-      </p:sp>
-      <p:sp>
-        <p:nvSpPr>
-          <p:cNvPr id="6" name="Rectangle 5"/>
-          <p:cNvSpPr/>
-          <p:nvPr/>
-        </p:nvSpPr>
-        <p:spPr>
-          <a:xfrm>
-            <a:off x="609600" y="923562"/>
-            <a:ext cx="609600" cy="609600"/>
-          </a:xfrm>
-          <a:prstGeom prst="rect">
-            <a:avLst/>
-          </a:prstGeom>
-          <a:ln>
-            <a:solidFill>
-              <a:schemeClr val="accent1">
-                <a:lumMod val="50000"/>
-              </a:schemeClr>
-            </a:solidFill>
-          </a:ln>
-        </p:spPr>
-        <p:style>
-          <a:lnRef idx="2">
-            <a:schemeClr val="accent1">
-              <a:shade val="50000"/>
-            </a:schemeClr>
-          </a:lnRef>
-          <a:fillRef idx="1">
-            <a:schemeClr val="accent1"/>
-          </a:fillRef>
-          <a:effectRef idx="0">
-            <a:schemeClr val="accent1"/>
-          </a:effectRef>
-          <a:fontRef idx="minor">
-            <a:schemeClr val="lt1"/>
-          </a:fontRef>
-        </p:style>
-        <p:txBody>
-          <a:bodyPr rtlCol="0" anchor="ctr"/>
-          <a:lstStyle/>
-          <a:p>
-            <a:pPr algn="ctr"/>
-            <a:r>
-              <a:rPr lang="en-US" dirty="0" smtClean="0"/>
-              <a:t>C</a:t>
-            </a:r>
-            <a:endParaRPr lang="en-US" dirty="0"/>
-          </a:p>
-        </p:txBody>
-      </p:sp>
-      <p:sp>
-        <p:nvSpPr>
-          <p:cNvPr id="7" name="Rectangle 6"/>
-          <p:cNvSpPr/>
-          <p:nvPr/>
-        </p:nvSpPr>
-        <p:spPr>
-          <a:xfrm>
-            <a:off x="1223010" y="923562"/>
-            <a:ext cx="609600" cy="609600"/>
-          </a:xfrm>
-          <a:prstGeom prst="rect">
-            <a:avLst/>
-          </a:prstGeom>
-          <a:ln>
-            <a:solidFill>
-              <a:schemeClr val="accent1">
-                <a:lumMod val="50000"/>
-              </a:schemeClr>
-            </a:solidFill>
-          </a:ln>
-        </p:spPr>
-        <p:style>
-          <a:lnRef idx="2">
-            <a:schemeClr val="accent1">
-              <a:shade val="50000"/>
-            </a:schemeClr>
-          </a:lnRef>
-          <a:fillRef idx="1">
-            <a:schemeClr val="accent1"/>
-          </a:fillRef>
-          <a:effectRef idx="0">
-            <a:schemeClr val="accent1"/>
-          </a:effectRef>
-          <a:fontRef idx="minor">
-            <a:schemeClr val="lt1"/>
-          </a:fontRef>
-        </p:style>
-        <p:txBody>
-          <a:bodyPr rtlCol="0" anchor="ctr"/>
-          <a:lstStyle/>
-          <a:p>
-            <a:pPr algn="ctr"/>
-            <a:r>
-              <a:rPr lang="en-US" dirty="0" smtClean="0"/>
-              <a:t>K</a:t>
-            </a:r>
-            <a:endParaRPr lang="en-US" dirty="0"/>
-          </a:p>
-        </p:txBody>
-      </p:sp>
-      <p:sp>
-        <p:nvSpPr>
-          <p:cNvPr id="8" name="Rectangle 7"/>
-          <p:cNvSpPr/>
-          <p:nvPr/>
-        </p:nvSpPr>
-        <p:spPr>
-          <a:xfrm>
-            <a:off x="1832610" y="923562"/>
-            <a:ext cx="609600" cy="609600"/>
-          </a:xfrm>
-          <a:prstGeom prst="rect">
-            <a:avLst/>
-          </a:prstGeom>
-          <a:ln>
-            <a:solidFill>
-              <a:schemeClr val="accent1">
-                <a:lumMod val="50000"/>
-              </a:schemeClr>
-            </a:solidFill>
-          </a:ln>
-        </p:spPr>
-        <p:style>
-          <a:lnRef idx="2">
-            <a:schemeClr val="accent1">
-              <a:shade val="50000"/>
-            </a:schemeClr>
-          </a:lnRef>
-          <a:fillRef idx="1">
-            <a:schemeClr val="accent1"/>
-          </a:fillRef>
-          <a:effectRef idx="0">
-            <a:schemeClr val="accent1"/>
-          </a:effectRef>
-          <a:fontRef idx="minor">
-            <a:schemeClr val="lt1"/>
-          </a:fontRef>
-        </p:style>
-        <p:txBody>
-          <a:bodyPr rtlCol="0" anchor="ctr"/>
-          <a:lstStyle/>
-          <a:p>
-            <a:pPr algn="ctr"/>
-            <a:r>
-              <a:rPr lang="en-US" dirty="0" smtClean="0"/>
-              <a:t>I</a:t>
-            </a:r>
-            <a:endParaRPr lang="en-US" dirty="0"/>
-          </a:p>
-        </p:txBody>
-      </p:sp>
-      <p:sp>
-        <p:nvSpPr>
-          <p:cNvPr id="9" name="Rectangle 8"/>
-          <p:cNvSpPr/>
-          <p:nvPr/>
-        </p:nvSpPr>
-        <p:spPr>
-          <a:xfrm>
-            <a:off x="2442210" y="923562"/>
-            <a:ext cx="609600" cy="609600"/>
-          </a:xfrm>
-          <a:prstGeom prst="rect">
-            <a:avLst/>
-          </a:prstGeom>
-          <a:ln>
-            <a:solidFill>
-              <a:schemeClr val="accent1">
-                <a:lumMod val="50000"/>
-              </a:schemeClr>
-            </a:solidFill>
-          </a:ln>
-        </p:spPr>
-        <p:style>
-          <a:lnRef idx="2">
-            <a:schemeClr val="accent1">
-              <a:shade val="50000"/>
-            </a:schemeClr>
-          </a:lnRef>
-          <a:fillRef idx="1">
-            <a:schemeClr val="accent1"/>
-          </a:fillRef>
-          <a:effectRef idx="0">
-            <a:schemeClr val="accent1"/>
-          </a:effectRef>
-          <a:fontRef idx="minor">
-            <a:schemeClr val="lt1"/>
-          </a:fontRef>
-        </p:style>
-        <p:txBody>
-          <a:bodyPr rtlCol="0" anchor="ctr"/>
-          <a:lstStyle/>
-          <a:p>
-            <a:pPr algn="ctr"/>
-            <a:r>
-              <a:rPr lang="en-US" dirty="0" smtClean="0"/>
-              <a:t>T</a:t>
-            </a:r>
-            <a:endParaRPr lang="en-US" dirty="0"/>
-          </a:p>
-        </p:txBody>
-      </p:sp>
-      <p:sp>
-        <p:nvSpPr>
-          <p:cNvPr id="10" name="Rectangle 9"/>
-          <p:cNvSpPr/>
-          <p:nvPr/>
-        </p:nvSpPr>
-        <p:spPr>
-          <a:xfrm>
-            <a:off x="8625948" y="0"/>
-            <a:ext cx="518052" cy="518052"/>
-          </a:xfrm>
-          <a:prstGeom prst="rect">
-            <a:avLst/>
-          </a:prstGeom>
-        </p:spPr>
-        <p:style>
-          <a:lnRef idx="2">
-            <a:schemeClr val="accent1">
-              <a:shade val="50000"/>
-            </a:schemeClr>
-          </a:lnRef>
-          <a:fillRef idx="1">
-            <a:schemeClr val="accent1"/>
-          </a:fillRef>
-          <a:effectRef idx="0">
-            <a:schemeClr val="accent1"/>
-          </a:effectRef>
-          <a:fontRef idx="minor">
-            <a:schemeClr val="lt1"/>
-          </a:fontRef>
-        </p:style>
-        <p:txBody>
-          <a:bodyPr rtlCol="0" anchor="ctr"/>
-          <a:lstStyle/>
-          <a:p>
-            <a:pPr algn="ctr"/>
-            <a:endParaRPr lang="en-US"/>
-          </a:p>
-        </p:txBody>
-      </p:sp>
-      <p:pic>
-        <p:nvPicPr>
-          <p:cNvPr id="1028" name="Picture 4" descr="C:\Users\Connor\AppData\Local\Microsoft\Windows\Temporary Internet Files\Content.IE5\5G0X10PF\MC900434742[1].png"/>
-          <p:cNvPicPr>
-            <a:picLocks noChangeAspect="1" noChangeArrowheads="1"/>
-          </p:cNvPicPr>
-          <p:nvPr/>
-        </p:nvPicPr>
-        <p:blipFill>
-          <a:blip r:embed="rId2" cstate="print">
-            <a:extLst>
-              <a:ext uri="{28A0092B-C50C-407E-A947-70E740481C1C}">
-                <a14:useLocalDpi xmlns:a14="http://schemas.microsoft.com/office/drawing/2010/main" xmlns="" val="0"/>
-              </a:ext>
-            </a:extLst>
-          </a:blip>
-          <a:srcRect/>
-          <a:stretch>
-            <a:fillRect/>
-          </a:stretch>
-        </p:blipFill>
-        <p:spPr bwMode="auto">
-          <a:xfrm>
-            <a:off x="8648771" y="22823"/>
-            <a:ext cx="472405" cy="472405"/>
-          </a:xfrm>
-          <a:prstGeom prst="rect">
-            <a:avLst/>
-          </a:prstGeom>
-          <a:noFill/>
-          <a:extLst>
-            <a:ext uri="{909E8E84-426E-40DD-AFC4-6F175D3DCCD1}">
-              <a14:hiddenFill xmlns:a14="http://schemas.microsoft.com/office/drawing/2010/main" xmlns="">
-                <a:solidFill>
-                  <a:srgbClr val="FFFFFF"/>
-                </a:solidFill>
-              </a14:hiddenFill>
-            </a:ext>
-          </a:extLst>
-        </p:spPr>
-      </p:pic>
-      <p:sp>
-        <p:nvSpPr>
-          <p:cNvPr id="14" name="Rectangle 13"/>
-          <p:cNvSpPr/>
-          <p:nvPr/>
-        </p:nvSpPr>
-        <p:spPr>
-          <a:xfrm>
-            <a:off x="8087576" y="0"/>
-            <a:ext cx="518052" cy="518052"/>
-          </a:xfrm>
-          <a:prstGeom prst="rect">
-            <a:avLst/>
-          </a:prstGeom>
-        </p:spPr>
-        <p:style>
-          <a:lnRef idx="2">
-            <a:schemeClr val="accent1">
-              <a:shade val="50000"/>
-            </a:schemeClr>
-          </a:lnRef>
-          <a:fillRef idx="1">
-            <a:schemeClr val="accent1"/>
-          </a:fillRef>
-          <a:effectRef idx="0">
-            <a:schemeClr val="accent1"/>
-          </a:effectRef>
-          <a:fontRef idx="minor">
-            <a:schemeClr val="lt1"/>
-          </a:fontRef>
-        </p:style>
-        <p:txBody>
-          <a:bodyPr rtlCol="0" anchor="ctr"/>
-          <a:lstStyle/>
-          <a:p>
-            <a:pPr algn="ctr"/>
-            <a:r>
-              <a:rPr lang="en-US" dirty="0" smtClean="0"/>
-              <a:t>?</a:t>
-            </a:r>
-            <a:endParaRPr lang="en-US" dirty="0"/>
-          </a:p>
-        </p:txBody>
-      </p:sp>
-      <p:sp>
-        <p:nvSpPr>
-          <p:cNvPr id="11" name="Rectangle 10"/>
-          <p:cNvSpPr/>
-          <p:nvPr/>
-        </p:nvSpPr>
-        <p:spPr>
-          <a:xfrm>
-            <a:off x="0" y="6324600"/>
-            <a:ext cx="1832610" cy="533400"/>
-          </a:xfrm>
-          <a:prstGeom prst="rect">
-            <a:avLst/>
-          </a:prstGeom>
-        </p:spPr>
-        <p:style>
-          <a:lnRef idx="2">
-            <a:schemeClr val="accent1">
-              <a:shade val="50000"/>
-            </a:schemeClr>
-          </a:lnRef>
-          <a:fillRef idx="1">
-            <a:schemeClr val="accent1"/>
-          </a:fillRef>
-          <a:effectRef idx="0">
-            <a:schemeClr val="accent1"/>
-          </a:effectRef>
-          <a:fontRef idx="minor">
-            <a:schemeClr val="lt1"/>
-          </a:fontRef>
-        </p:style>
-        <p:txBody>
-          <a:bodyPr rtlCol="0" anchor="ctr"/>
-          <a:lstStyle/>
-          <a:p>
-            <a:pPr algn="ctr"/>
-            <a:r>
-              <a:rPr lang="en-US" dirty="0" smtClean="0"/>
-              <a:t>Wait</a:t>
-            </a:r>
-            <a:endParaRPr lang="en-US" dirty="0"/>
-          </a:p>
-        </p:txBody>
-      </p:sp>
-      <p:sp>
-        <p:nvSpPr>
-          <p:cNvPr id="16" name="Rectangle 15"/>
-          <p:cNvSpPr/>
-          <p:nvPr/>
-        </p:nvSpPr>
-        <p:spPr>
-          <a:xfrm>
-            <a:off x="-1905" y="5791200"/>
-            <a:ext cx="1832610" cy="533400"/>
-          </a:xfrm>
-          <a:prstGeom prst="rect">
-            <a:avLst/>
-          </a:prstGeom>
-        </p:spPr>
-        <p:style>
-          <a:lnRef idx="2">
-            <a:schemeClr val="accent1">
-              <a:shade val="50000"/>
-            </a:schemeClr>
-          </a:lnRef>
-          <a:fillRef idx="1">
-            <a:schemeClr val="accent1"/>
-          </a:fillRef>
-          <a:effectRef idx="0">
-            <a:schemeClr val="accent1"/>
-          </a:effectRef>
-          <a:fontRef idx="minor">
-            <a:schemeClr val="lt1"/>
-          </a:fontRef>
-        </p:style>
-        <p:txBody>
-          <a:bodyPr rtlCol="0" anchor="ctr"/>
-          <a:lstStyle/>
-          <a:p>
-            <a:r>
-              <a:rPr lang="en-US" dirty="0" smtClean="0"/>
-              <a:t>    Minor</a:t>
-            </a:r>
-            <a:endParaRPr lang="en-US" dirty="0"/>
-          </a:p>
-        </p:txBody>
-      </p:sp>
-      <p:sp>
-        <p:nvSpPr>
-          <p:cNvPr id="12" name="Rectangle 11"/>
-          <p:cNvSpPr/>
-          <p:nvPr/>
-        </p:nvSpPr>
-        <p:spPr>
-          <a:xfrm>
-            <a:off x="990600" y="5842000"/>
-            <a:ext cx="609600" cy="152400"/>
-          </a:xfrm>
-          <a:prstGeom prst="rect">
-            <a:avLst/>
-          </a:prstGeom>
-          <a:solidFill>
-            <a:schemeClr val="bg1"/>
-          </a:solidFill>
-        </p:spPr>
-        <p:style>
-          <a:lnRef idx="2">
-            <a:schemeClr val="accent1">
-              <a:shade val="50000"/>
-            </a:schemeClr>
-          </a:lnRef>
-          <a:fillRef idx="1">
-            <a:schemeClr val="accent1"/>
-          </a:fillRef>
-          <a:effectRef idx="0">
-            <a:schemeClr val="accent1"/>
-          </a:effectRef>
-          <a:fontRef idx="minor">
-            <a:schemeClr val="lt1"/>
-          </a:fontRef>
-        </p:style>
-        <p:txBody>
-          <a:bodyPr rtlCol="0" anchor="ctr"/>
-          <a:lstStyle/>
-          <a:p>
-            <a:pPr algn="ctr"/>
-            <a:endParaRPr lang="en-US"/>
-          </a:p>
-        </p:txBody>
-      </p:sp>
-      <p:sp>
-        <p:nvSpPr>
-          <p:cNvPr id="18" name="Rectangle 17"/>
-          <p:cNvSpPr/>
-          <p:nvPr/>
-        </p:nvSpPr>
-        <p:spPr>
-          <a:xfrm>
-            <a:off x="990600" y="6088380"/>
-            <a:ext cx="609600" cy="152400"/>
-          </a:xfrm>
-          <a:prstGeom prst="rect">
-            <a:avLst/>
-          </a:prstGeom>
-          <a:solidFill>
-            <a:schemeClr val="bg1"/>
-          </a:solidFill>
-        </p:spPr>
-        <p:style>
-          <a:lnRef idx="2">
-            <a:schemeClr val="accent1">
-              <a:shade val="50000"/>
-            </a:schemeClr>
-          </a:lnRef>
-          <a:fillRef idx="1">
-            <a:schemeClr val="accent1"/>
-          </a:fillRef>
-          <a:effectRef idx="0">
-            <a:schemeClr val="accent1"/>
-          </a:effectRef>
-          <a:fontRef idx="minor">
-            <a:schemeClr val="lt1"/>
-          </a:fontRef>
-        </p:style>
-        <p:txBody>
-          <a:bodyPr rtlCol="0" anchor="ctr"/>
-          <a:lstStyle/>
-          <a:p>
-            <a:pPr algn="ctr"/>
-            <a:endParaRPr lang="en-US"/>
-          </a:p>
-        </p:txBody>
-      </p:sp>
-      <p:sp>
-        <p:nvSpPr>
-          <p:cNvPr id="19" name="Rectangle 18"/>
-          <p:cNvSpPr/>
-          <p:nvPr/>
-        </p:nvSpPr>
-        <p:spPr>
-          <a:xfrm>
-            <a:off x="-1905" y="5257800"/>
-            <a:ext cx="1832610" cy="533400"/>
-          </a:xfrm>
-          <a:prstGeom prst="rect">
-            <a:avLst/>
-          </a:prstGeom>
-          <a:solidFill>
-            <a:schemeClr val="accent1">
-              <a:lumMod val="50000"/>
-            </a:schemeClr>
-          </a:solidFill>
-        </p:spPr>
-        <p:style>
-          <a:lnRef idx="2">
-            <a:schemeClr val="accent1">
-              <a:shade val="50000"/>
-            </a:schemeClr>
-          </a:lnRef>
-          <a:fillRef idx="1">
-            <a:schemeClr val="accent1"/>
-          </a:fillRef>
-          <a:effectRef idx="0">
-            <a:schemeClr val="accent1"/>
-          </a:effectRef>
-          <a:fontRef idx="minor">
-            <a:schemeClr val="lt1"/>
-          </a:fontRef>
-        </p:style>
-        <p:txBody>
-          <a:bodyPr rtlCol="0" anchor="ctr"/>
-          <a:lstStyle/>
-          <a:p>
-            <a:pPr algn="ctr"/>
-            <a:r>
-              <a:rPr lang="en-US" dirty="0" smtClean="0"/>
-              <a:t>  Standard</a:t>
-            </a:r>
-            <a:endParaRPr lang="en-US" dirty="0"/>
-          </a:p>
-        </p:txBody>
-      </p:sp>
-      <p:sp>
-        <p:nvSpPr>
-          <p:cNvPr id="20" name="Rectangle 19"/>
-          <p:cNvSpPr/>
-          <p:nvPr/>
-        </p:nvSpPr>
-        <p:spPr>
-          <a:xfrm>
-            <a:off x="0" y="4724400"/>
-            <a:ext cx="1832610" cy="533400"/>
-          </a:xfrm>
-          <a:prstGeom prst="rect">
-            <a:avLst/>
-          </a:prstGeom>
-        </p:spPr>
-        <p:style>
-          <a:lnRef idx="2">
-            <a:schemeClr val="accent1">
-              <a:shade val="50000"/>
-            </a:schemeClr>
-          </a:lnRef>
-          <a:fillRef idx="1">
-            <a:schemeClr val="accent1"/>
-          </a:fillRef>
-          <a:effectRef idx="0">
-            <a:schemeClr val="accent1"/>
-          </a:effectRef>
-          <a:fontRef idx="minor">
-            <a:schemeClr val="lt1"/>
-          </a:fontRef>
-        </p:style>
-        <p:txBody>
-          <a:bodyPr rtlCol="0" anchor="ctr"/>
-          <a:lstStyle/>
-          <a:p>
-            <a:pPr algn="ctr"/>
-            <a:r>
-              <a:rPr lang="en-US" dirty="0" smtClean="0"/>
-              <a:t>  Movement</a:t>
-            </a:r>
-            <a:endParaRPr lang="en-US" dirty="0"/>
-          </a:p>
-        </p:txBody>
-      </p:sp>
     </p:spTree>
-    <p:extLst>
-      <p:ext uri="{BB962C8B-B14F-4D97-AF65-F5344CB8AC3E}">
-        <p14:creationId xmlns:p14="http://schemas.microsoft.com/office/powerpoint/2010/main" xmlns="" val="230200905"/>
-      </p:ext>
-    </p:extLst>
   </p:cSld>
   <p:clrMapOvr>
     <a:masterClrMapping/>
@@ -4208,7 +4224,7 @@
           <a:blip r:embed="rId2" cstate="print">
             <a:extLst>
               <a:ext uri="{28A0092B-C50C-407E-A947-70E740481C1C}">
-                <a14:useLocalDpi xmlns:a14="http://schemas.microsoft.com/office/drawing/2010/main" xmlns="" val="0"/>
+                <a14:useLocalDpi xmlns:a14="http://schemas.microsoft.com/office/drawing/2010/main" val="0"/>
               </a:ext>
             </a:extLst>
           </a:blip>
@@ -4228,7 +4244,7 @@
           <a:noFill/>
           <a:extLst>
             <a:ext uri="{909E8E84-426E-40DD-AFC4-6F175D3DCCD1}">
-              <a14:hiddenFill xmlns:a14="http://schemas.microsoft.com/office/drawing/2010/main" xmlns="">
+              <a14:hiddenFill xmlns:a14="http://schemas.microsoft.com/office/drawing/2010/main">
                 <a:solidFill>
                   <a:srgbClr val="FFFFFF"/>
                 </a:solidFill>
@@ -4976,7 +4992,7 @@
     </p:spTree>
     <p:extLst>
       <p:ext uri="{BB962C8B-B14F-4D97-AF65-F5344CB8AC3E}">
-        <p14:creationId xmlns:p14="http://schemas.microsoft.com/office/powerpoint/2010/main" xmlns="" val="1916122945"/>
+        <p14:creationId xmlns:p14="http://schemas.microsoft.com/office/powerpoint/2010/main" val="1916122945"/>
       </p:ext>
     </p:extLst>
   </p:cSld>
@@ -5207,7 +5223,7 @@
           <a:blip r:embed="rId2" cstate="print">
             <a:extLst>
               <a:ext uri="{28A0092B-C50C-407E-A947-70E740481C1C}">
-                <a14:useLocalDpi xmlns:a14="http://schemas.microsoft.com/office/drawing/2010/main" xmlns="" val="0"/>
+                <a14:useLocalDpi xmlns:a14="http://schemas.microsoft.com/office/drawing/2010/main" val="0"/>
               </a:ext>
             </a:extLst>
           </a:blip>
@@ -5227,7 +5243,7 @@
           <a:noFill/>
           <a:extLst>
             <a:ext uri="{909E8E84-426E-40DD-AFC4-6F175D3DCCD1}">
-              <a14:hiddenFill xmlns:a14="http://schemas.microsoft.com/office/drawing/2010/main" xmlns="">
+              <a14:hiddenFill xmlns:a14="http://schemas.microsoft.com/office/drawing/2010/main">
                 <a:solidFill>
                   <a:srgbClr val="FFFFFF"/>
                 </a:solidFill>
@@ -6374,7 +6390,7 @@
           <a:blip r:embed="rId3" cstate="print">
             <a:extLst>
               <a:ext uri="{28A0092B-C50C-407E-A947-70E740481C1C}">
-                <a14:useLocalDpi xmlns:a14="http://schemas.microsoft.com/office/drawing/2010/main" xmlns="" val="0"/>
+                <a14:useLocalDpi xmlns:a14="http://schemas.microsoft.com/office/drawing/2010/main" val="0"/>
               </a:ext>
             </a:extLst>
           </a:blip>
@@ -6394,7 +6410,7 @@
           <a:noFill/>
           <a:extLst>
             <a:ext uri="{909E8E84-426E-40DD-AFC4-6F175D3DCCD1}">
-              <a14:hiddenFill xmlns:a14="http://schemas.microsoft.com/office/drawing/2010/main" xmlns="">
+              <a14:hiddenFill xmlns:a14="http://schemas.microsoft.com/office/drawing/2010/main">
                 <a:solidFill>
                   <a:srgbClr val="FFFFFF"/>
                 </a:solidFill>
@@ -6415,7 +6431,7 @@
           <a:blip r:embed="rId3" cstate="print">
             <a:extLst>
               <a:ext uri="{28A0092B-C50C-407E-A947-70E740481C1C}">
-                <a14:useLocalDpi xmlns:a14="http://schemas.microsoft.com/office/drawing/2010/main" xmlns="" val="0"/>
+                <a14:useLocalDpi xmlns:a14="http://schemas.microsoft.com/office/drawing/2010/main" val="0"/>
               </a:ext>
             </a:extLst>
           </a:blip>
@@ -6435,7 +6451,7 @@
           <a:noFill/>
           <a:extLst>
             <a:ext uri="{909E8E84-426E-40DD-AFC4-6F175D3DCCD1}">
-              <a14:hiddenFill xmlns:a14="http://schemas.microsoft.com/office/drawing/2010/main" xmlns="">
+              <a14:hiddenFill xmlns:a14="http://schemas.microsoft.com/office/drawing/2010/main">
                 <a:solidFill>
                   <a:srgbClr val="FFFFFF"/>
                 </a:solidFill>
@@ -6738,7 +6754,7 @@
     </p:spTree>
     <p:extLst>
       <p:ext uri="{BB962C8B-B14F-4D97-AF65-F5344CB8AC3E}">
-        <p14:creationId xmlns:p14="http://schemas.microsoft.com/office/powerpoint/2010/main" xmlns="" val="2703675010"/>
+        <p14:creationId xmlns:p14="http://schemas.microsoft.com/office/powerpoint/2010/main" val="2703675010"/>
       </p:ext>
     </p:extLst>
   </p:cSld>
@@ -7177,7 +7193,7 @@
           <a:blip r:embed="rId2" cstate="print">
             <a:extLst>
               <a:ext uri="{28A0092B-C50C-407E-A947-70E740481C1C}">
-                <a14:useLocalDpi xmlns:a14="http://schemas.microsoft.com/office/drawing/2010/main" xmlns="" val="0"/>
+                <a14:useLocalDpi xmlns:a14="http://schemas.microsoft.com/office/drawing/2010/main" val="0"/>
               </a:ext>
             </a:extLst>
           </a:blip>
@@ -7197,7 +7213,7 @@
           <a:noFill/>
           <a:extLst>
             <a:ext uri="{909E8E84-426E-40DD-AFC4-6F175D3DCCD1}">
-              <a14:hiddenFill xmlns:a14="http://schemas.microsoft.com/office/drawing/2010/main" xmlns="">
+              <a14:hiddenFill xmlns:a14="http://schemas.microsoft.com/office/drawing/2010/main">
                 <a:solidFill>
                   <a:srgbClr val="FFFFFF"/>
                 </a:solidFill>
@@ -9202,7 +9218,7 @@
     </p:spTree>
     <p:extLst>
       <p:ext uri="{BB962C8B-B14F-4D97-AF65-F5344CB8AC3E}">
-        <p14:creationId xmlns:p14="http://schemas.microsoft.com/office/powerpoint/2010/main" xmlns="" val="3222865792"/>
+        <p14:creationId xmlns:p14="http://schemas.microsoft.com/office/powerpoint/2010/main" val="3222865792"/>
       </p:ext>
     </p:extLst>
   </p:cSld>
@@ -9636,7 +9652,7 @@
           <a:blip r:embed="rId2" cstate="print">
             <a:extLst>
               <a:ext uri="{28A0092B-C50C-407E-A947-70E740481C1C}">
-                <a14:useLocalDpi xmlns:a14="http://schemas.microsoft.com/office/drawing/2010/main" xmlns="" val="0"/>
+                <a14:useLocalDpi xmlns:a14="http://schemas.microsoft.com/office/drawing/2010/main" val="0"/>
               </a:ext>
             </a:extLst>
           </a:blip>
@@ -9656,7 +9672,7 @@
           <a:noFill/>
           <a:extLst>
             <a:ext uri="{909E8E84-426E-40DD-AFC4-6F175D3DCCD1}">
-              <a14:hiddenFill xmlns:a14="http://schemas.microsoft.com/office/drawing/2010/main" xmlns="">
+              <a14:hiddenFill xmlns:a14="http://schemas.microsoft.com/office/drawing/2010/main">
                 <a:solidFill>
                   <a:srgbClr val="FFFFFF"/>
                 </a:solidFill>
@@ -11988,7 +12004,7 @@
     </p:spTree>
     <p:extLst>
       <p:ext uri="{BB962C8B-B14F-4D97-AF65-F5344CB8AC3E}">
-        <p14:creationId xmlns:p14="http://schemas.microsoft.com/office/powerpoint/2010/main" xmlns="" val="2988061221"/>
+        <p14:creationId xmlns:p14="http://schemas.microsoft.com/office/powerpoint/2010/main" val="2988061221"/>
       </p:ext>
     </p:extLst>
   </p:cSld>
@@ -12226,7 +12242,7 @@
           <a:blip r:embed="rId2" cstate="print">
             <a:extLst>
               <a:ext uri="{28A0092B-C50C-407E-A947-70E740481C1C}">
-                <a14:useLocalDpi xmlns:a14="http://schemas.microsoft.com/office/drawing/2010/main" xmlns="" val="0"/>
+                <a14:useLocalDpi xmlns:a14="http://schemas.microsoft.com/office/drawing/2010/main" val="0"/>
               </a:ext>
             </a:extLst>
           </a:blip>
@@ -12246,7 +12262,7 @@
           <a:noFill/>
           <a:extLst>
             <a:ext uri="{909E8E84-426E-40DD-AFC4-6F175D3DCCD1}">
-              <a14:hiddenFill xmlns:a14="http://schemas.microsoft.com/office/drawing/2010/main" xmlns="">
+              <a14:hiddenFill xmlns:a14="http://schemas.microsoft.com/office/drawing/2010/main">
                 <a:solidFill>
                   <a:srgbClr val="FFFFFF"/>
                 </a:solidFill>
@@ -14691,7 +14707,7 @@
     </p:spTree>
     <p:extLst>
       <p:ext uri="{BB962C8B-B14F-4D97-AF65-F5344CB8AC3E}">
-        <p14:creationId xmlns:p14="http://schemas.microsoft.com/office/powerpoint/2010/main" xmlns="" val="1218614478"/>
+        <p14:creationId xmlns:p14="http://schemas.microsoft.com/office/powerpoint/2010/main" val="1218614478"/>
       </p:ext>
     </p:extLst>
   </p:cSld>
@@ -14929,7 +14945,7 @@
           <a:blip r:embed="rId2" cstate="print">
             <a:extLst>
               <a:ext uri="{28A0092B-C50C-407E-A947-70E740481C1C}">
-                <a14:useLocalDpi xmlns:a14="http://schemas.microsoft.com/office/drawing/2010/main" xmlns="" val="0"/>
+                <a14:useLocalDpi xmlns:a14="http://schemas.microsoft.com/office/drawing/2010/main" val="0"/>
               </a:ext>
             </a:extLst>
           </a:blip>
@@ -14949,7 +14965,7 @@
           <a:noFill/>
           <a:extLst>
             <a:ext uri="{909E8E84-426E-40DD-AFC4-6F175D3DCCD1}">
-              <a14:hiddenFill xmlns:a14="http://schemas.microsoft.com/office/drawing/2010/main" xmlns="">
+              <a14:hiddenFill xmlns:a14="http://schemas.microsoft.com/office/drawing/2010/main">
                 <a:solidFill>
                   <a:srgbClr val="FFFFFF"/>
                 </a:solidFill>
@@ -17083,7 +17099,7 @@
     </p:spTree>
     <p:extLst>
       <p:ext uri="{BB962C8B-B14F-4D97-AF65-F5344CB8AC3E}">
-        <p14:creationId xmlns:p14="http://schemas.microsoft.com/office/powerpoint/2010/main" xmlns="" val="276805881"/>
+        <p14:creationId xmlns:p14="http://schemas.microsoft.com/office/powerpoint/2010/main" val="276805881"/>
       </p:ext>
     </p:extLst>
   </p:cSld>

</xml_diff>

<commit_message>
Removed Builds folder, added it to gitignore, updated a slideof the Wireframes, changed Wait to say End Turn, added the last 2 Mentor Meeting Notes.
</commit_message>
<xml_diff>
--- a/Documents/Bel Nix Wireframes.pptx
+++ b/Documents/Bel Nix Wireframes.pptx
@@ -128,7 +128,7 @@
   </p:defaultTextStyle>
   <p:extLst>
     <p:ext uri="{EFAFB233-063F-42B5-8137-9DF3F51BA10A}">
-      <p15:sldGuideLst xmlns:p15="http://schemas.microsoft.com/office/powerpoint/2012/main">
+      <p15:sldGuideLst xmlns:p15="http://schemas.microsoft.com/office/powerpoint/2012/main" xmlns="">
         <p15:guide id="1" orient="horz" pos="2160">
           <p15:clr>
             <a:srgbClr val="A4A3A4"/>
@@ -327,7 +327,7 @@
             <a:fld id="{DFEB74F4-18E0-45A9-BC28-087929DA7966}" type="datetimeFigureOut">
               <a:rPr lang="en-US" smtClean="0"/>
               <a:pPr/>
-              <a:t>11/16/2014</a:t>
+              <a:t>12/4/2014</a:t>
             </a:fld>
             <a:endParaRPr lang="en-US"/>
           </a:p>
@@ -494,7 +494,7 @@
             <a:fld id="{DFEB74F4-18E0-45A9-BC28-087929DA7966}" type="datetimeFigureOut">
               <a:rPr lang="en-US" smtClean="0"/>
               <a:pPr/>
-              <a:t>11/16/2014</a:t>
+              <a:t>12/4/2014</a:t>
             </a:fld>
             <a:endParaRPr lang="en-US"/>
           </a:p>
@@ -671,7 +671,7 @@
             <a:fld id="{DFEB74F4-18E0-45A9-BC28-087929DA7966}" type="datetimeFigureOut">
               <a:rPr lang="en-US" smtClean="0"/>
               <a:pPr/>
-              <a:t>11/16/2014</a:t>
+              <a:t>12/4/2014</a:t>
             </a:fld>
             <a:endParaRPr lang="en-US"/>
           </a:p>
@@ -838,7 +838,7 @@
             <a:fld id="{DFEB74F4-18E0-45A9-BC28-087929DA7966}" type="datetimeFigureOut">
               <a:rPr lang="en-US" smtClean="0"/>
               <a:pPr/>
-              <a:t>11/16/2014</a:t>
+              <a:t>12/4/2014</a:t>
             </a:fld>
             <a:endParaRPr lang="en-US"/>
           </a:p>
@@ -1081,7 +1081,7 @@
             <a:fld id="{DFEB74F4-18E0-45A9-BC28-087929DA7966}" type="datetimeFigureOut">
               <a:rPr lang="en-US" smtClean="0"/>
               <a:pPr/>
-              <a:t>11/16/2014</a:t>
+              <a:t>12/4/2014</a:t>
             </a:fld>
             <a:endParaRPr lang="en-US"/>
           </a:p>
@@ -1366,7 +1366,7 @@
             <a:fld id="{DFEB74F4-18E0-45A9-BC28-087929DA7966}" type="datetimeFigureOut">
               <a:rPr lang="en-US" smtClean="0"/>
               <a:pPr/>
-              <a:t>11/16/2014</a:t>
+              <a:t>12/4/2014</a:t>
             </a:fld>
             <a:endParaRPr lang="en-US"/>
           </a:p>
@@ -1785,7 +1785,7 @@
             <a:fld id="{DFEB74F4-18E0-45A9-BC28-087929DA7966}" type="datetimeFigureOut">
               <a:rPr lang="en-US" smtClean="0"/>
               <a:pPr/>
-              <a:t>11/16/2014</a:t>
+              <a:t>12/4/2014</a:t>
             </a:fld>
             <a:endParaRPr lang="en-US"/>
           </a:p>
@@ -1900,7 +1900,7 @@
             <a:fld id="{DFEB74F4-18E0-45A9-BC28-087929DA7966}" type="datetimeFigureOut">
               <a:rPr lang="en-US" smtClean="0"/>
               <a:pPr/>
-              <a:t>11/16/2014</a:t>
+              <a:t>12/4/2014</a:t>
             </a:fld>
             <a:endParaRPr lang="en-US"/>
           </a:p>
@@ -1992,7 +1992,7 @@
             <a:fld id="{DFEB74F4-18E0-45A9-BC28-087929DA7966}" type="datetimeFigureOut">
               <a:rPr lang="en-US" smtClean="0"/>
               <a:pPr/>
-              <a:t>11/16/2014</a:t>
+              <a:t>12/4/2014</a:t>
             </a:fld>
             <a:endParaRPr lang="en-US"/>
           </a:p>
@@ -2266,7 +2266,7 @@
             <a:fld id="{DFEB74F4-18E0-45A9-BC28-087929DA7966}" type="datetimeFigureOut">
               <a:rPr lang="en-US" smtClean="0"/>
               <a:pPr/>
-              <a:t>11/16/2014</a:t>
+              <a:t>12/4/2014</a:t>
             </a:fld>
             <a:endParaRPr lang="en-US"/>
           </a:p>
@@ -2516,7 +2516,7 @@
             <a:fld id="{DFEB74F4-18E0-45A9-BC28-087929DA7966}" type="datetimeFigureOut">
               <a:rPr lang="en-US" smtClean="0"/>
               <a:pPr/>
-              <a:t>11/16/2014</a:t>
+              <a:t>12/4/2014</a:t>
             </a:fld>
             <a:endParaRPr lang="en-US"/>
           </a:p>
@@ -2726,7 +2726,7 @@
             <a:fld id="{DFEB74F4-18E0-45A9-BC28-087929DA7966}" type="datetimeFigureOut">
               <a:rPr lang="en-US" smtClean="0"/>
               <a:pPr/>
-              <a:t>11/16/2014</a:t>
+              <a:t>12/4/2014</a:t>
             </a:fld>
             <a:endParaRPr lang="en-US"/>
           </a:p>
@@ -3332,7 +3332,7 @@
       </p:sp>
       <p:sp>
         <p:nvSpPr>
-          <p:cNvPr id="5" name="Rectangle 4"/>
+          <p:cNvPr id="6" name="Rectangle 5"/>
           <p:cNvSpPr/>
           <p:nvPr/>
         </p:nvSpPr>
@@ -3375,7 +3375,7 @@
             <a:pPr algn="ctr"/>
             <a:r>
               <a:rPr lang="en-US" dirty="0" smtClean="0"/>
-              <a:t>M</a:t>
+              <a:t>C</a:t>
             </a:r>
             <a:endParaRPr lang="en-US" dirty="0"/>
           </a:p>
@@ -3383,13 +3383,13 @@
       </p:sp>
       <p:sp>
         <p:nvSpPr>
-          <p:cNvPr id="6" name="Rectangle 5"/>
-          <p:cNvSpPr/>
-          <p:nvPr/>
-        </p:nvSpPr>
-        <p:spPr>
-          <a:xfrm>
-            <a:off x="609600" y="923562"/>
+          <p:cNvPr id="7" name="Rectangle 6"/>
+          <p:cNvSpPr/>
+          <p:nvPr/>
+        </p:nvSpPr>
+        <p:spPr>
+          <a:xfrm>
+            <a:off x="613410" y="923562"/>
             <a:ext cx="609600" cy="609600"/>
           </a:xfrm>
           <a:prstGeom prst="rect">
@@ -3426,7 +3426,7 @@
             <a:pPr algn="ctr"/>
             <a:r>
               <a:rPr lang="en-US" dirty="0" smtClean="0"/>
-              <a:t>C</a:t>
+              <a:t>K</a:t>
             </a:r>
             <a:endParaRPr lang="en-US" dirty="0"/>
           </a:p>
@@ -3434,7 +3434,7 @@
       </p:sp>
       <p:sp>
         <p:nvSpPr>
-          <p:cNvPr id="7" name="Rectangle 6"/>
+          <p:cNvPr id="8" name="Rectangle 7"/>
           <p:cNvSpPr/>
           <p:nvPr/>
         </p:nvSpPr>
@@ -3477,7 +3477,7 @@
             <a:pPr algn="ctr"/>
             <a:r>
               <a:rPr lang="en-US" dirty="0" smtClean="0"/>
-              <a:t>K</a:t>
+              <a:t>I</a:t>
             </a:r>
             <a:endParaRPr lang="en-US" dirty="0"/>
           </a:p>
@@ -3485,13 +3485,278 @@
       </p:sp>
       <p:sp>
         <p:nvSpPr>
-          <p:cNvPr id="8" name="Rectangle 7"/>
-          <p:cNvSpPr/>
-          <p:nvPr/>
-        </p:nvSpPr>
-        <p:spPr>
-          <a:xfrm>
-            <a:off x="1832610" y="923562"/>
+          <p:cNvPr id="11" name="Rectangle 10"/>
+          <p:cNvSpPr/>
+          <p:nvPr/>
+        </p:nvSpPr>
+        <p:spPr>
+          <a:xfrm>
+            <a:off x="0" y="6324600"/>
+            <a:ext cx="1832610" cy="533400"/>
+          </a:xfrm>
+          <a:prstGeom prst="rect">
+            <a:avLst/>
+          </a:prstGeom>
+        </p:spPr>
+        <p:style>
+          <a:lnRef idx="2">
+            <a:schemeClr val="accent1">
+              <a:shade val="50000"/>
+            </a:schemeClr>
+          </a:lnRef>
+          <a:fillRef idx="1">
+            <a:schemeClr val="accent1"/>
+          </a:fillRef>
+          <a:effectRef idx="0">
+            <a:schemeClr val="accent1"/>
+          </a:effectRef>
+          <a:fontRef idx="minor">
+            <a:schemeClr val="lt1"/>
+          </a:fontRef>
+        </p:style>
+        <p:txBody>
+          <a:bodyPr rtlCol="0" anchor="ctr"/>
+          <a:lstStyle/>
+          <a:p>
+            <a:pPr algn="ctr"/>
+            <a:r>
+              <a:rPr lang="en-US" dirty="0" smtClean="0"/>
+              <a:t>End Turn</a:t>
+            </a:r>
+          </a:p>
+        </p:txBody>
+      </p:sp>
+      <p:sp>
+        <p:nvSpPr>
+          <p:cNvPr id="16" name="Rectangle 15"/>
+          <p:cNvSpPr/>
+          <p:nvPr/>
+        </p:nvSpPr>
+        <p:spPr>
+          <a:xfrm>
+            <a:off x="-1905" y="5791200"/>
+            <a:ext cx="1832610" cy="533400"/>
+          </a:xfrm>
+          <a:prstGeom prst="rect">
+            <a:avLst/>
+          </a:prstGeom>
+        </p:spPr>
+        <p:style>
+          <a:lnRef idx="2">
+            <a:schemeClr val="accent1">
+              <a:shade val="50000"/>
+            </a:schemeClr>
+          </a:lnRef>
+          <a:fillRef idx="1">
+            <a:schemeClr val="accent1"/>
+          </a:fillRef>
+          <a:effectRef idx="0">
+            <a:schemeClr val="accent1"/>
+          </a:effectRef>
+          <a:fontRef idx="minor">
+            <a:schemeClr val="lt1"/>
+          </a:fontRef>
+        </p:style>
+        <p:txBody>
+          <a:bodyPr rtlCol="0" anchor="ctr"/>
+          <a:lstStyle/>
+          <a:p>
+            <a:r>
+              <a:rPr lang="en-US" dirty="0" smtClean="0"/>
+              <a:t>    Minor</a:t>
+            </a:r>
+            <a:endParaRPr lang="en-US" dirty="0"/>
+          </a:p>
+        </p:txBody>
+      </p:sp>
+      <p:sp>
+        <p:nvSpPr>
+          <p:cNvPr id="12" name="Rectangle 11"/>
+          <p:cNvSpPr/>
+          <p:nvPr/>
+        </p:nvSpPr>
+        <p:spPr>
+          <a:xfrm>
+            <a:off x="990600" y="5842000"/>
+            <a:ext cx="609600" cy="152400"/>
+          </a:xfrm>
+          <a:prstGeom prst="rect">
+            <a:avLst/>
+          </a:prstGeom>
+          <a:solidFill>
+            <a:schemeClr val="bg1"/>
+          </a:solidFill>
+        </p:spPr>
+        <p:style>
+          <a:lnRef idx="2">
+            <a:schemeClr val="accent1">
+              <a:shade val="50000"/>
+            </a:schemeClr>
+          </a:lnRef>
+          <a:fillRef idx="1">
+            <a:schemeClr val="accent1"/>
+          </a:fillRef>
+          <a:effectRef idx="0">
+            <a:schemeClr val="accent1"/>
+          </a:effectRef>
+          <a:fontRef idx="minor">
+            <a:schemeClr val="lt1"/>
+          </a:fontRef>
+        </p:style>
+        <p:txBody>
+          <a:bodyPr rtlCol="0" anchor="ctr"/>
+          <a:lstStyle/>
+          <a:p>
+            <a:pPr algn="ctr"/>
+            <a:endParaRPr lang="en-US"/>
+          </a:p>
+        </p:txBody>
+      </p:sp>
+      <p:sp>
+        <p:nvSpPr>
+          <p:cNvPr id="18" name="Rectangle 17"/>
+          <p:cNvSpPr/>
+          <p:nvPr/>
+        </p:nvSpPr>
+        <p:spPr>
+          <a:xfrm>
+            <a:off x="990600" y="6088380"/>
+            <a:ext cx="609600" cy="152400"/>
+          </a:xfrm>
+          <a:prstGeom prst="rect">
+            <a:avLst/>
+          </a:prstGeom>
+          <a:solidFill>
+            <a:schemeClr val="bg1"/>
+          </a:solidFill>
+        </p:spPr>
+        <p:style>
+          <a:lnRef idx="2">
+            <a:schemeClr val="accent1">
+              <a:shade val="50000"/>
+            </a:schemeClr>
+          </a:lnRef>
+          <a:fillRef idx="1">
+            <a:schemeClr val="accent1"/>
+          </a:fillRef>
+          <a:effectRef idx="0">
+            <a:schemeClr val="accent1"/>
+          </a:effectRef>
+          <a:fontRef idx="minor">
+            <a:schemeClr val="lt1"/>
+          </a:fontRef>
+        </p:style>
+        <p:txBody>
+          <a:bodyPr rtlCol="0" anchor="ctr"/>
+          <a:lstStyle/>
+          <a:p>
+            <a:pPr algn="ctr"/>
+            <a:endParaRPr lang="en-US"/>
+          </a:p>
+        </p:txBody>
+      </p:sp>
+      <p:sp>
+        <p:nvSpPr>
+          <p:cNvPr id="19" name="Rectangle 18"/>
+          <p:cNvSpPr/>
+          <p:nvPr/>
+        </p:nvSpPr>
+        <p:spPr>
+          <a:xfrm>
+            <a:off x="-1905" y="5257800"/>
+            <a:ext cx="1832610" cy="533400"/>
+          </a:xfrm>
+          <a:prstGeom prst="rect">
+            <a:avLst/>
+          </a:prstGeom>
+          <a:solidFill>
+            <a:schemeClr val="accent1">
+              <a:lumMod val="50000"/>
+            </a:schemeClr>
+          </a:solidFill>
+        </p:spPr>
+        <p:style>
+          <a:lnRef idx="2">
+            <a:schemeClr val="accent1">
+              <a:shade val="50000"/>
+            </a:schemeClr>
+          </a:lnRef>
+          <a:fillRef idx="1">
+            <a:schemeClr val="accent1"/>
+          </a:fillRef>
+          <a:effectRef idx="0">
+            <a:schemeClr val="accent1"/>
+          </a:effectRef>
+          <a:fontRef idx="minor">
+            <a:schemeClr val="lt1"/>
+          </a:fontRef>
+        </p:style>
+        <p:txBody>
+          <a:bodyPr rtlCol="0" anchor="ctr"/>
+          <a:lstStyle/>
+          <a:p>
+            <a:pPr algn="ctr"/>
+            <a:r>
+              <a:rPr lang="en-US" dirty="0" smtClean="0"/>
+              <a:t>  Standard</a:t>
+            </a:r>
+            <a:endParaRPr lang="en-US" dirty="0"/>
+          </a:p>
+        </p:txBody>
+      </p:sp>
+      <p:sp>
+        <p:nvSpPr>
+          <p:cNvPr id="20" name="Rectangle 19"/>
+          <p:cNvSpPr/>
+          <p:nvPr/>
+        </p:nvSpPr>
+        <p:spPr>
+          <a:xfrm>
+            <a:off x="0" y="4724400"/>
+            <a:ext cx="1832610" cy="533400"/>
+          </a:xfrm>
+          <a:prstGeom prst="rect">
+            <a:avLst/>
+          </a:prstGeom>
+        </p:spPr>
+        <p:style>
+          <a:lnRef idx="2">
+            <a:schemeClr val="accent1">
+              <a:shade val="50000"/>
+            </a:schemeClr>
+          </a:lnRef>
+          <a:fillRef idx="1">
+            <a:schemeClr val="accent1"/>
+          </a:fillRef>
+          <a:effectRef idx="0">
+            <a:schemeClr val="accent1"/>
+          </a:effectRef>
+          <a:fontRef idx="minor">
+            <a:schemeClr val="lt1"/>
+          </a:fontRef>
+        </p:style>
+        <p:txBody>
+          <a:bodyPr rtlCol="0" anchor="ctr"/>
+          <a:lstStyle/>
+          <a:p>
+            <a:pPr algn="ctr"/>
+            <a:r>
+              <a:rPr lang="en-US" dirty="0" smtClean="0"/>
+              <a:t>  Movement</a:t>
+            </a:r>
+            <a:endParaRPr lang="en-US" dirty="0"/>
+          </a:p>
+        </p:txBody>
+      </p:sp>
+      <p:sp>
+        <p:nvSpPr>
+          <p:cNvPr id="21" name="Rectangle 20"/>
+          <p:cNvSpPr/>
+          <p:nvPr/>
+        </p:nvSpPr>
+        <p:spPr>
+          <a:xfrm>
+            <a:off x="7357964" y="4096247"/>
             <a:ext cx="609600" cy="609600"/>
           </a:xfrm>
           <a:prstGeom prst="rect">
@@ -3528,7 +3793,7 @@
             <a:pPr algn="ctr"/>
             <a:r>
               <a:rPr lang="en-US" dirty="0" smtClean="0"/>
-              <a:t>I</a:t>
+              <a:t>M</a:t>
             </a:r>
             <a:endParaRPr lang="en-US" dirty="0"/>
           </a:p>
@@ -3536,18 +3801,23 @@
       </p:sp>
       <p:sp>
         <p:nvSpPr>
-          <p:cNvPr id="9" name="Rectangle 8"/>
-          <p:cNvSpPr/>
-          <p:nvPr/>
-        </p:nvSpPr>
-        <p:spPr>
-          <a:xfrm>
-            <a:off x="2442210" y="923562"/>
+          <p:cNvPr id="23" name="Rectangle 22"/>
+          <p:cNvSpPr/>
+          <p:nvPr/>
+        </p:nvSpPr>
+        <p:spPr>
+          <a:xfrm>
+            <a:off x="6748364" y="4096247"/>
             <a:ext cx="609600" cy="609600"/>
           </a:xfrm>
           <a:prstGeom prst="rect">
             <a:avLst/>
           </a:prstGeom>
+          <a:solidFill>
+            <a:schemeClr val="accent1">
+              <a:lumMod val="50000"/>
+            </a:schemeClr>
+          </a:solidFill>
           <a:ln>
             <a:solidFill>
               <a:schemeClr val="accent1">
@@ -3587,395 +3857,77 @@
       </p:sp>
       <p:sp>
         <p:nvSpPr>
-          <p:cNvPr id="10" name="Rectangle 9"/>
-          <p:cNvSpPr/>
-          <p:nvPr/>
-        </p:nvSpPr>
-        <p:spPr>
-          <a:xfrm>
-            <a:off x="8625948" y="0"/>
-            <a:ext cx="518052" cy="518052"/>
-          </a:xfrm>
-          <a:prstGeom prst="rect">
-            <a:avLst/>
-          </a:prstGeom>
-        </p:spPr>
-        <p:style>
-          <a:lnRef idx="2">
-            <a:schemeClr val="accent1">
-              <a:shade val="50000"/>
-            </a:schemeClr>
-          </a:lnRef>
-          <a:fillRef idx="1">
-            <a:schemeClr val="accent1"/>
-          </a:fillRef>
-          <a:effectRef idx="0">
-            <a:schemeClr val="accent1"/>
-          </a:effectRef>
-          <a:fontRef idx="minor">
-            <a:schemeClr val="lt1"/>
-          </a:fontRef>
-        </p:style>
-        <p:txBody>
-          <a:bodyPr rtlCol="0" anchor="ctr"/>
-          <a:lstStyle/>
-          <a:p>
-            <a:pPr algn="ctr"/>
-            <a:endParaRPr lang="en-US"/>
+          <p:cNvPr id="24" name="Rectangle 23"/>
+          <p:cNvSpPr/>
+          <p:nvPr/>
+        </p:nvSpPr>
+        <p:spPr>
+          <a:xfrm>
+            <a:off x="6746459" y="3562847"/>
+            <a:ext cx="1832610" cy="533400"/>
+          </a:xfrm>
+          <a:prstGeom prst="rect">
+            <a:avLst/>
+          </a:prstGeom>
+        </p:spPr>
+        <p:style>
+          <a:lnRef idx="2">
+            <a:schemeClr val="accent1">
+              <a:shade val="50000"/>
+            </a:schemeClr>
+          </a:lnRef>
+          <a:fillRef idx="1">
+            <a:schemeClr val="accent1"/>
+          </a:fillRef>
+          <a:effectRef idx="0">
+            <a:schemeClr val="accent1"/>
+          </a:effectRef>
+          <a:fontRef idx="minor">
+            <a:schemeClr val="lt1"/>
+          </a:fontRef>
+        </p:style>
+        <p:txBody>
+          <a:bodyPr rtlCol="0" anchor="ctr"/>
+          <a:lstStyle/>
+          <a:p>
+            <a:pPr algn="ctr"/>
+            <a:r>
+              <a:rPr lang="en-US" dirty="0" smtClean="0"/>
+              <a:t>End Turn</a:t>
+            </a:r>
           </a:p>
         </p:txBody>
       </p:sp>
       <p:pic>
         <p:nvPicPr>
-          <p:cNvPr id="1028" name="Picture 4" descr="C:\Users\Connor\AppData\Local\Microsoft\Windows\Temporary Internet Files\Content.IE5\5G0X10PF\MC900434742[1].png"/>
+          <p:cNvPr id="15" name="Picture 14"/>
           <p:cNvPicPr>
-            <a:picLocks noChangeAspect="1" noChangeArrowheads="1"/>
+            <a:picLocks noChangeAspect="1"/>
           </p:cNvPicPr>
           <p:nvPr/>
         </p:nvPicPr>
         <p:blipFill>
-          <a:blip r:embed="rId2" cstate="print">
+          <a:blip r:embed="rId2">
             <a:extLst>
               <a:ext uri="{28A0092B-C50C-407E-A947-70E740481C1C}">
                 <a14:useLocalDpi xmlns:a14="http://schemas.microsoft.com/office/drawing/2010/main" val="0"/>
               </a:ext>
             </a:extLst>
           </a:blip>
-          <a:srcRect/>
           <a:stretch>
             <a:fillRect/>
           </a:stretch>
         </p:blipFill>
-        <p:spPr bwMode="auto">
-          <a:xfrm>
-            <a:off x="8648771" y="22823"/>
-            <a:ext cx="472405" cy="472405"/>
-          </a:xfrm>
-          <a:prstGeom prst="rect">
-            <a:avLst/>
-          </a:prstGeom>
-          <a:noFill/>
-          <a:extLst>
-            <a:ext uri="{909E8E84-426E-40DD-AFC4-6F175D3DCCD1}">
-              <a14:hiddenFill xmlns:a14="http://schemas.microsoft.com/office/drawing/2010/main">
-                <a:solidFill>
-                  <a:srgbClr val="FFFFFF"/>
-                </a:solidFill>
-              </a14:hiddenFill>
-            </a:ext>
-          </a:extLst>
+        <p:spPr>
+          <a:xfrm>
+            <a:off x="6746083" y="0"/>
+            <a:ext cx="2419688" cy="3562847"/>
+          </a:xfrm>
+          <a:prstGeom prst="rect">
+            <a:avLst/>
+          </a:prstGeom>
         </p:spPr>
       </p:pic>
-      <p:sp>
-        <p:nvSpPr>
-          <p:cNvPr id="14" name="Rectangle 13"/>
-          <p:cNvSpPr/>
-          <p:nvPr/>
-        </p:nvSpPr>
-        <p:spPr>
-          <a:xfrm>
-            <a:off x="8087576" y="0"/>
-            <a:ext cx="518052" cy="518052"/>
-          </a:xfrm>
-          <a:prstGeom prst="rect">
-            <a:avLst/>
-          </a:prstGeom>
-        </p:spPr>
-        <p:style>
-          <a:lnRef idx="2">
-            <a:schemeClr val="accent1">
-              <a:shade val="50000"/>
-            </a:schemeClr>
-          </a:lnRef>
-          <a:fillRef idx="1">
-            <a:schemeClr val="accent1"/>
-          </a:fillRef>
-          <a:effectRef idx="0">
-            <a:schemeClr val="accent1"/>
-          </a:effectRef>
-          <a:fontRef idx="minor">
-            <a:schemeClr val="lt1"/>
-          </a:fontRef>
-        </p:style>
-        <p:txBody>
-          <a:bodyPr rtlCol="0" anchor="ctr"/>
-          <a:lstStyle/>
-          <a:p>
-            <a:pPr algn="ctr"/>
-            <a:r>
-              <a:rPr lang="en-US" dirty="0" smtClean="0"/>
-              <a:t>?</a:t>
-            </a:r>
-            <a:endParaRPr lang="en-US" dirty="0"/>
-          </a:p>
-        </p:txBody>
-      </p:sp>
-      <p:sp>
-        <p:nvSpPr>
-          <p:cNvPr id="11" name="Rectangle 10"/>
-          <p:cNvSpPr/>
-          <p:nvPr/>
-        </p:nvSpPr>
-        <p:spPr>
-          <a:xfrm>
-            <a:off x="0" y="6324600"/>
-            <a:ext cx="1832610" cy="533400"/>
-          </a:xfrm>
-          <a:prstGeom prst="rect">
-            <a:avLst/>
-          </a:prstGeom>
-        </p:spPr>
-        <p:style>
-          <a:lnRef idx="2">
-            <a:schemeClr val="accent1">
-              <a:shade val="50000"/>
-            </a:schemeClr>
-          </a:lnRef>
-          <a:fillRef idx="1">
-            <a:schemeClr val="accent1"/>
-          </a:fillRef>
-          <a:effectRef idx="0">
-            <a:schemeClr val="accent1"/>
-          </a:effectRef>
-          <a:fontRef idx="minor">
-            <a:schemeClr val="lt1"/>
-          </a:fontRef>
-        </p:style>
-        <p:txBody>
-          <a:bodyPr rtlCol="0" anchor="ctr"/>
-          <a:lstStyle/>
-          <a:p>
-            <a:pPr algn="ctr"/>
-            <a:r>
-              <a:rPr lang="en-US" dirty="0" smtClean="0"/>
-              <a:t>Wait</a:t>
-            </a:r>
-            <a:endParaRPr lang="en-US" dirty="0"/>
-          </a:p>
-        </p:txBody>
-      </p:sp>
-      <p:sp>
-        <p:nvSpPr>
-          <p:cNvPr id="16" name="Rectangle 15"/>
-          <p:cNvSpPr/>
-          <p:nvPr/>
-        </p:nvSpPr>
-        <p:spPr>
-          <a:xfrm>
-            <a:off x="-1905" y="5791200"/>
-            <a:ext cx="1832610" cy="533400"/>
-          </a:xfrm>
-          <a:prstGeom prst="rect">
-            <a:avLst/>
-          </a:prstGeom>
-        </p:spPr>
-        <p:style>
-          <a:lnRef idx="2">
-            <a:schemeClr val="accent1">
-              <a:shade val="50000"/>
-            </a:schemeClr>
-          </a:lnRef>
-          <a:fillRef idx="1">
-            <a:schemeClr val="accent1"/>
-          </a:fillRef>
-          <a:effectRef idx="0">
-            <a:schemeClr val="accent1"/>
-          </a:effectRef>
-          <a:fontRef idx="minor">
-            <a:schemeClr val="lt1"/>
-          </a:fontRef>
-        </p:style>
-        <p:txBody>
-          <a:bodyPr rtlCol="0" anchor="ctr"/>
-          <a:lstStyle/>
-          <a:p>
-            <a:r>
-              <a:rPr lang="en-US" dirty="0" smtClean="0"/>
-              <a:t>    Minor</a:t>
-            </a:r>
-            <a:endParaRPr lang="en-US" dirty="0"/>
-          </a:p>
-        </p:txBody>
-      </p:sp>
-      <p:sp>
-        <p:nvSpPr>
-          <p:cNvPr id="12" name="Rectangle 11"/>
-          <p:cNvSpPr/>
-          <p:nvPr/>
-        </p:nvSpPr>
-        <p:spPr>
-          <a:xfrm>
-            <a:off x="990600" y="5842000"/>
-            <a:ext cx="609600" cy="152400"/>
-          </a:xfrm>
-          <a:prstGeom prst="rect">
-            <a:avLst/>
-          </a:prstGeom>
-          <a:solidFill>
-            <a:schemeClr val="bg1"/>
-          </a:solidFill>
-        </p:spPr>
-        <p:style>
-          <a:lnRef idx="2">
-            <a:schemeClr val="accent1">
-              <a:shade val="50000"/>
-            </a:schemeClr>
-          </a:lnRef>
-          <a:fillRef idx="1">
-            <a:schemeClr val="accent1"/>
-          </a:fillRef>
-          <a:effectRef idx="0">
-            <a:schemeClr val="accent1"/>
-          </a:effectRef>
-          <a:fontRef idx="minor">
-            <a:schemeClr val="lt1"/>
-          </a:fontRef>
-        </p:style>
-        <p:txBody>
-          <a:bodyPr rtlCol="0" anchor="ctr"/>
-          <a:lstStyle/>
-          <a:p>
-            <a:pPr algn="ctr"/>
-            <a:endParaRPr lang="en-US"/>
-          </a:p>
-        </p:txBody>
-      </p:sp>
-      <p:sp>
-        <p:nvSpPr>
-          <p:cNvPr id="18" name="Rectangle 17"/>
-          <p:cNvSpPr/>
-          <p:nvPr/>
-        </p:nvSpPr>
-        <p:spPr>
-          <a:xfrm>
-            <a:off x="990600" y="6088380"/>
-            <a:ext cx="609600" cy="152400"/>
-          </a:xfrm>
-          <a:prstGeom prst="rect">
-            <a:avLst/>
-          </a:prstGeom>
-          <a:solidFill>
-            <a:schemeClr val="bg1"/>
-          </a:solidFill>
-        </p:spPr>
-        <p:style>
-          <a:lnRef idx="2">
-            <a:schemeClr val="accent1">
-              <a:shade val="50000"/>
-            </a:schemeClr>
-          </a:lnRef>
-          <a:fillRef idx="1">
-            <a:schemeClr val="accent1"/>
-          </a:fillRef>
-          <a:effectRef idx="0">
-            <a:schemeClr val="accent1"/>
-          </a:effectRef>
-          <a:fontRef idx="minor">
-            <a:schemeClr val="lt1"/>
-          </a:fontRef>
-        </p:style>
-        <p:txBody>
-          <a:bodyPr rtlCol="0" anchor="ctr"/>
-          <a:lstStyle/>
-          <a:p>
-            <a:pPr algn="ctr"/>
-            <a:endParaRPr lang="en-US"/>
-          </a:p>
-        </p:txBody>
-      </p:sp>
-      <p:sp>
-        <p:nvSpPr>
-          <p:cNvPr id="19" name="Rectangle 18"/>
-          <p:cNvSpPr/>
-          <p:nvPr/>
-        </p:nvSpPr>
-        <p:spPr>
-          <a:xfrm>
-            <a:off x="-1905" y="5257800"/>
-            <a:ext cx="1832610" cy="533400"/>
-          </a:xfrm>
-          <a:prstGeom prst="rect">
-            <a:avLst/>
-          </a:prstGeom>
-          <a:solidFill>
-            <a:schemeClr val="accent1">
-              <a:lumMod val="50000"/>
-            </a:schemeClr>
-          </a:solidFill>
-        </p:spPr>
-        <p:style>
-          <a:lnRef idx="2">
-            <a:schemeClr val="accent1">
-              <a:shade val="50000"/>
-            </a:schemeClr>
-          </a:lnRef>
-          <a:fillRef idx="1">
-            <a:schemeClr val="accent1"/>
-          </a:fillRef>
-          <a:effectRef idx="0">
-            <a:schemeClr val="accent1"/>
-          </a:effectRef>
-          <a:fontRef idx="minor">
-            <a:schemeClr val="lt1"/>
-          </a:fontRef>
-        </p:style>
-        <p:txBody>
-          <a:bodyPr rtlCol="0" anchor="ctr"/>
-          <a:lstStyle/>
-          <a:p>
-            <a:pPr algn="ctr"/>
-            <a:r>
-              <a:rPr lang="en-US" dirty="0" smtClean="0"/>
-              <a:t>  Standard</a:t>
-            </a:r>
-            <a:endParaRPr lang="en-US" dirty="0"/>
-          </a:p>
-        </p:txBody>
-      </p:sp>
-      <p:sp>
-        <p:nvSpPr>
-          <p:cNvPr id="20" name="Rectangle 19"/>
-          <p:cNvSpPr/>
-          <p:nvPr/>
-        </p:nvSpPr>
-        <p:spPr>
-          <a:xfrm>
-            <a:off x="0" y="4724400"/>
-            <a:ext cx="1832610" cy="533400"/>
-          </a:xfrm>
-          <a:prstGeom prst="rect">
-            <a:avLst/>
-          </a:prstGeom>
-        </p:spPr>
-        <p:style>
-          <a:lnRef idx="2">
-            <a:schemeClr val="accent1">
-              <a:shade val="50000"/>
-            </a:schemeClr>
-          </a:lnRef>
-          <a:fillRef idx="1">
-            <a:schemeClr val="accent1"/>
-          </a:fillRef>
-          <a:effectRef idx="0">
-            <a:schemeClr val="accent1"/>
-          </a:effectRef>
-          <a:fontRef idx="minor">
-            <a:schemeClr val="lt1"/>
-          </a:fontRef>
-        </p:style>
-        <p:txBody>
-          <a:bodyPr rtlCol="0" anchor="ctr"/>
-          <a:lstStyle/>
-          <a:p>
-            <a:pPr algn="ctr"/>
-            <a:r>
-              <a:rPr lang="en-US" dirty="0" smtClean="0"/>
-              <a:t>  Movement</a:t>
-            </a:r>
-            <a:endParaRPr lang="en-US" dirty="0"/>
-          </a:p>
-        </p:txBody>
-      </p:sp>
     </p:spTree>
     <p:extLst>
       <p:ext uri="{BB962C8B-B14F-4D97-AF65-F5344CB8AC3E}">

</xml_diff>